<commit_message>
Updating slides, more discussion, more examples
</commit_message>
<xml_diff>
--- a/P0361R1 - Invoking Algorithms Asynchronously.pptx
+++ b/P0361R1 - Invoking Algorithms Asynchronously.pptx
@@ -5,17 +5,19 @@
     <p:sldMasterId id="2147483660" r:id="rId1"/>
   </p:sldMasterIdLst>
   <p:notesMasterIdLst>
-    <p:notesMasterId r:id="rId10"/>
+    <p:notesMasterId r:id="rId12"/>
   </p:notesMasterIdLst>
   <p:sldIdLst>
     <p:sldId id="256" r:id="rId2"/>
     <p:sldId id="257" r:id="rId3"/>
     <p:sldId id="259" r:id="rId4"/>
     <p:sldId id="261" r:id="rId5"/>
-    <p:sldId id="263" r:id="rId6"/>
-    <p:sldId id="262" r:id="rId7"/>
-    <p:sldId id="264" r:id="rId8"/>
-    <p:sldId id="260" r:id="rId9"/>
+    <p:sldId id="266" r:id="rId6"/>
+    <p:sldId id="263" r:id="rId7"/>
+    <p:sldId id="262" r:id="rId8"/>
+    <p:sldId id="264" r:id="rId9"/>
+    <p:sldId id="265" r:id="rId10"/>
+    <p:sldId id="260" r:id="rId11"/>
   </p:sldIdLst>
   <p:sldSz cx="12192000" cy="6858000"/>
   <p:notesSz cx="6858000" cy="9144000"/>
@@ -215,7 +217,7 @@
           <a:p>
             <a:fld id="{CA7762D2-16F8-476B-9B81-2147770D2EE4}" type="datetimeFigureOut">
               <a:rPr lang="en-US" smtClean="0"/>
-              <a:t>11/7/2016</a:t>
+              <a:t>11/8/2016</a:t>
             </a:fld>
             <a:endParaRPr lang="en-US"/>
           </a:p>
@@ -716,7 +718,7 @@
           <a:p>
             <a:fld id="{9895210F-3153-47D6-B786-4D5C9DCDB62B}" type="slidenum">
               <a:rPr lang="en-US" smtClean="0"/>
-              <a:t>8</a:t>
+              <a:t>10</a:t>
             </a:fld>
             <a:endParaRPr lang="en-US"/>
           </a:p>
@@ -4652,6 +4654,328 @@
 </p:sld>
 </file>
 
+<file path=ppt/slides/slide10.xml><?xml version="1.0" encoding="utf-8"?>
+<p:sld xmlns:a="http://schemas.openxmlformats.org/drawingml/2006/main" xmlns:r="http://schemas.openxmlformats.org/officeDocument/2006/relationships" xmlns:p="http://schemas.openxmlformats.org/presentationml/2006/main">
+  <p:cSld>
+    <p:spTree>
+      <p:nvGrpSpPr>
+        <p:cNvPr id="1" name=""/>
+        <p:cNvGrpSpPr/>
+        <p:nvPr/>
+      </p:nvGrpSpPr>
+      <p:grpSpPr>
+        <a:xfrm>
+          <a:off x="0" y="0"/>
+          <a:ext cx="0" cy="0"/>
+          <a:chOff x="0" y="0"/>
+          <a:chExt cx="0" cy="0"/>
+        </a:xfrm>
+      </p:grpSpPr>
+      <p:pic>
+        <p:nvPicPr>
+          <p:cNvPr id="7" name="Picture 6"/>
+          <p:cNvPicPr>
+            <a:picLocks noChangeAspect="1"/>
+          </p:cNvPicPr>
+          <p:nvPr/>
+        </p:nvPicPr>
+        <p:blipFill>
+          <a:blip r:embed="rId3">
+            <a:extLst>
+              <a:ext uri="{28A0092B-C50C-407E-A947-70E740481C1C}">
+                <a14:useLocalDpi xmlns:a14="http://schemas.microsoft.com/office/drawing/2010/main" val="0"/>
+              </a:ext>
+            </a:extLst>
+          </a:blip>
+          <a:stretch>
+            <a:fillRect/>
+          </a:stretch>
+        </p:blipFill>
+        <p:spPr>
+          <a:xfrm>
+            <a:off x="834937" y="561634"/>
+            <a:ext cx="3810000" cy="2857500"/>
+          </a:xfrm>
+          <a:prstGeom prst="rect">
+            <a:avLst/>
+          </a:prstGeom>
+        </p:spPr>
+      </p:pic>
+      <p:pic>
+        <p:nvPicPr>
+          <p:cNvPr id="8" name="Picture 7"/>
+          <p:cNvPicPr>
+            <a:picLocks noChangeAspect="1"/>
+          </p:cNvPicPr>
+          <p:nvPr/>
+        </p:nvPicPr>
+        <p:blipFill>
+          <a:blip r:embed="rId4">
+            <a:extLst>
+              <a:ext uri="{28A0092B-C50C-407E-A947-70E740481C1C}">
+                <a14:useLocalDpi xmlns:a14="http://schemas.microsoft.com/office/drawing/2010/main" val="0"/>
+              </a:ext>
+            </a:extLst>
+          </a:blip>
+          <a:stretch>
+            <a:fillRect/>
+          </a:stretch>
+        </p:blipFill>
+        <p:spPr>
+          <a:xfrm>
+            <a:off x="7079735" y="3419134"/>
+            <a:ext cx="3813602" cy="2860201"/>
+          </a:xfrm>
+          <a:prstGeom prst="rect">
+            <a:avLst/>
+          </a:prstGeom>
+        </p:spPr>
+      </p:pic>
+      <p:pic>
+        <p:nvPicPr>
+          <p:cNvPr id="9" name="Picture 8"/>
+          <p:cNvPicPr>
+            <a:picLocks noChangeAspect="1"/>
+          </p:cNvPicPr>
+          <p:nvPr/>
+        </p:nvPicPr>
+        <p:blipFill>
+          <a:blip r:embed="rId5">
+            <a:extLst>
+              <a:ext uri="{28A0092B-C50C-407E-A947-70E740481C1C}">
+                <a14:useLocalDpi xmlns:a14="http://schemas.microsoft.com/office/drawing/2010/main" val="0"/>
+              </a:ext>
+            </a:extLst>
+          </a:blip>
+          <a:stretch>
+            <a:fillRect/>
+          </a:stretch>
+        </p:blipFill>
+        <p:spPr>
+          <a:xfrm>
+            <a:off x="3955536" y="2182075"/>
+            <a:ext cx="3813600" cy="2860200"/>
+          </a:xfrm>
+          <a:prstGeom prst="rect">
+            <a:avLst/>
+          </a:prstGeom>
+        </p:spPr>
+      </p:pic>
+      <p:pic>
+        <p:nvPicPr>
+          <p:cNvPr id="10" name="Picture 9"/>
+          <p:cNvPicPr>
+            <a:picLocks noChangeAspect="1"/>
+          </p:cNvPicPr>
+          <p:nvPr/>
+        </p:nvPicPr>
+        <p:blipFill>
+          <a:blip r:embed="rId6" cstate="print">
+            <a:extLst>
+              <a:ext uri="{28A0092B-C50C-407E-A947-70E740481C1C}">
+                <a14:useLocalDpi xmlns:a14="http://schemas.microsoft.com/office/drawing/2010/main" val="0"/>
+              </a:ext>
+            </a:extLst>
+          </a:blip>
+          <a:stretch>
+            <a:fillRect/>
+          </a:stretch>
+        </p:blipFill>
+        <p:spPr>
+          <a:xfrm>
+            <a:off x="831619" y="3805215"/>
+            <a:ext cx="2795905" cy="1866267"/>
+          </a:xfrm>
+          <a:prstGeom prst="rect">
+            <a:avLst/>
+          </a:prstGeom>
+        </p:spPr>
+      </p:pic>
+      <p:pic>
+        <p:nvPicPr>
+          <p:cNvPr id="11" name="Picture 10"/>
+          <p:cNvPicPr>
+            <a:picLocks noChangeAspect="1"/>
+          </p:cNvPicPr>
+          <p:nvPr/>
+        </p:nvPicPr>
+        <p:blipFill>
+          <a:blip r:embed="rId7" cstate="print">
+            <a:extLst>
+              <a:ext uri="{28A0092B-C50C-407E-A947-70E740481C1C}">
+                <a14:useLocalDpi xmlns:a14="http://schemas.microsoft.com/office/drawing/2010/main" val="0"/>
+              </a:ext>
+            </a:extLst>
+          </a:blip>
+          <a:stretch>
+            <a:fillRect/>
+          </a:stretch>
+        </p:blipFill>
+        <p:spPr>
+          <a:xfrm>
+            <a:off x="8097147" y="1181098"/>
+            <a:ext cx="2796189" cy="1839224"/>
+          </a:xfrm>
+          <a:prstGeom prst="rect">
+            <a:avLst/>
+          </a:prstGeom>
+        </p:spPr>
+      </p:pic>
+      <p:pic>
+        <p:nvPicPr>
+          <p:cNvPr id="13" name="Picture 12"/>
+          <p:cNvPicPr>
+            <a:picLocks noChangeAspect="1"/>
+          </p:cNvPicPr>
+          <p:nvPr/>
+        </p:nvPicPr>
+        <p:blipFill>
+          <a:blip r:embed="rId8" cstate="print">
+            <a:extLst>
+              <a:ext uri="{28A0092B-C50C-407E-A947-70E740481C1C}">
+                <a14:useLocalDpi xmlns:a14="http://schemas.microsoft.com/office/drawing/2010/main" val="0"/>
+              </a:ext>
+            </a:extLst>
+          </a:blip>
+          <a:stretch>
+            <a:fillRect/>
+          </a:stretch>
+        </p:blipFill>
+        <p:spPr>
+          <a:xfrm>
+            <a:off x="4891759" y="859264"/>
+            <a:ext cx="2958566" cy="643669"/>
+          </a:xfrm>
+          <a:prstGeom prst="rect">
+            <a:avLst/>
+          </a:prstGeom>
+          <a:noFill/>
+          <a:ln>
+            <a:noFill/>
+          </a:ln>
+        </p:spPr>
+      </p:pic>
+      <p:pic>
+        <p:nvPicPr>
+          <p:cNvPr id="16" name="Picture 15"/>
+          <p:cNvPicPr>
+            <a:picLocks noChangeAspect="1"/>
+          </p:cNvPicPr>
+          <p:nvPr/>
+        </p:nvPicPr>
+        <p:blipFill>
+          <a:blip r:embed="rId9" cstate="print">
+            <a:extLst>
+              <a:ext uri="{28A0092B-C50C-407E-A947-70E740481C1C}">
+                <a14:useLocalDpi xmlns:a14="http://schemas.microsoft.com/office/drawing/2010/main" val="0"/>
+              </a:ext>
+            </a:extLst>
+          </a:blip>
+          <a:stretch>
+            <a:fillRect/>
+          </a:stretch>
+        </p:blipFill>
+        <p:spPr>
+          <a:xfrm>
+            <a:off x="4068578" y="5452033"/>
+            <a:ext cx="2570102" cy="346964"/>
+          </a:xfrm>
+          <a:prstGeom prst="rect">
+            <a:avLst/>
+          </a:prstGeom>
+        </p:spPr>
+      </p:pic>
+      <p:sp>
+        <p:nvSpPr>
+          <p:cNvPr id="2" name="Date Placeholder 1"/>
+          <p:cNvSpPr>
+            <a:spLocks noGrp="1"/>
+          </p:cNvSpPr>
+          <p:nvPr>
+            <p:ph type="dt" sz="half" idx="10"/>
+          </p:nvPr>
+        </p:nvSpPr>
+        <p:spPr/>
+        <p:txBody>
+          <a:bodyPr/>
+          <a:lstStyle/>
+          <a:p>
+            <a:r>
+              <a:rPr lang="en-US" smtClean="0"/>
+              <a:t>11/7/2016</a:t>
+            </a:r>
+            <a:endParaRPr lang="en-US"/>
+          </a:p>
+        </p:txBody>
+      </p:sp>
+      <p:sp>
+        <p:nvSpPr>
+          <p:cNvPr id="3" name="Footer Placeholder 2"/>
+          <p:cNvSpPr>
+            <a:spLocks noGrp="1"/>
+          </p:cNvSpPr>
+          <p:nvPr>
+            <p:ph type="ftr" sz="quarter" idx="11"/>
+          </p:nvPr>
+        </p:nvSpPr>
+        <p:spPr/>
+        <p:txBody>
+          <a:bodyPr/>
+          <a:lstStyle/>
+          <a:p>
+            <a:r>
+              <a:rPr lang="en-US" smtClean="0"/>
+              <a:t>P0361R2: Invoking Algorithms Asynchronously</a:t>
+            </a:r>
+            <a:endParaRPr lang="en-US"/>
+          </a:p>
+        </p:txBody>
+      </p:sp>
+      <p:sp>
+        <p:nvSpPr>
+          <p:cNvPr id="4" name="Slide Number Placeholder 3"/>
+          <p:cNvSpPr>
+            <a:spLocks noGrp="1"/>
+          </p:cNvSpPr>
+          <p:nvPr>
+            <p:ph type="sldNum" sz="quarter" idx="12"/>
+          </p:nvPr>
+        </p:nvSpPr>
+        <p:spPr/>
+        <p:txBody>
+          <a:bodyPr>
+            <a:normAutofit lnSpcReduction="10000"/>
+          </a:bodyPr>
+          <a:lstStyle/>
+          <a:p>
+            <a:fld id="{65339F38-439B-42BE-A6DB-D203DE66964E}" type="slidenum">
+              <a:rPr lang="en-US" smtClean="0"/>
+              <a:t>10</a:t>
+            </a:fld>
+            <a:endParaRPr lang="en-US"/>
+          </a:p>
+        </p:txBody>
+      </p:sp>
+    </p:spTree>
+    <p:extLst>
+      <p:ext uri="{BB962C8B-B14F-4D97-AF65-F5344CB8AC3E}">
+        <p14:creationId xmlns:p14="http://schemas.microsoft.com/office/powerpoint/2010/main" val="3929842033"/>
+      </p:ext>
+    </p:extLst>
+  </p:cSld>
+  <p:clrMapOvr>
+    <a:masterClrMapping/>
+  </p:clrMapOvr>
+  <p:timing>
+    <p:tnLst>
+      <p:par>
+        <p:cTn id="1" dur="indefinite" restart="never" nodeType="tmRoot"/>
+      </p:par>
+    </p:tnLst>
+  </p:timing>
+</p:sld>
+</file>
+
 <file path=ppt/slides/slide2.xml><?xml version="1.0" encoding="utf-8"?>
 <p:sld xmlns:a="http://schemas.openxmlformats.org/drawingml/2006/main" xmlns:r="http://schemas.openxmlformats.org/officeDocument/2006/relationships" xmlns:p="http://schemas.openxmlformats.org/presentationml/2006/main">
   <p:cSld>
@@ -5106,17 +5430,8 @@
             <a:pPr lvl="1"/>
             <a:r>
               <a:rPr lang="en-US" dirty="0" smtClean="0"/>
-              <a:t>In </a:t>
-            </a:r>
-            <a:r>
-              <a:rPr lang="en-US" dirty="0" smtClean="0"/>
-              <a:t>all cases the formerly synchronous functions return a future</a:t>
-            </a:r>
-            <a:r>
-              <a:rPr lang="en-US" dirty="0" smtClean="0"/>
-              <a:t>&lt;&gt; representing the overall result</a:t>
-            </a:r>
-            <a:endParaRPr lang="en-US" dirty="0" smtClean="0"/>
+              <a:t>In all cases the formerly synchronous functions return a future&lt;&gt; representing the overall result</a:t>
+            </a:r>
           </a:p>
           <a:p>
             <a:pPr lvl="1"/>
@@ -5262,6 +5577,44 @@
       </p:grpSpPr>
       <p:sp>
         <p:nvSpPr>
+          <p:cNvPr id="10" name="Rectangle 9"/>
+          <p:cNvSpPr/>
+          <p:nvPr/>
+        </p:nvSpPr>
+        <p:spPr>
+          <a:xfrm>
+            <a:off x="800100" y="1741119"/>
+            <a:ext cx="10485120" cy="4488814"/>
+          </a:xfrm>
+          <a:prstGeom prst="rect">
+            <a:avLst/>
+          </a:prstGeom>
+        </p:spPr>
+        <p:style>
+          <a:lnRef idx="1">
+            <a:schemeClr val="accent1"/>
+          </a:lnRef>
+          <a:fillRef idx="2">
+            <a:schemeClr val="accent1"/>
+          </a:fillRef>
+          <a:effectRef idx="1">
+            <a:schemeClr val="accent1"/>
+          </a:effectRef>
+          <a:fontRef idx="minor">
+            <a:schemeClr val="dk1"/>
+          </a:fontRef>
+        </p:style>
+        <p:txBody>
+          <a:bodyPr rtlCol="0" anchor="ctr"/>
+          <a:lstStyle/>
+          <a:p>
+            <a:pPr algn="ctr"/>
+            <a:endParaRPr lang="en-US"/>
+          </a:p>
+        </p:txBody>
+      </p:sp>
+      <p:sp>
+        <p:nvSpPr>
           <p:cNvPr id="8" name="Title 7"/>
           <p:cNvSpPr>
             <a:spLocks noGrp="1"/>
@@ -5387,25 +5740,7 @@
                 </a:solidFill>
                 <a:latin typeface="Consolas" panose="020B0609020204030204" pitchFamily="49" charset="0"/>
               </a:rPr>
-              <a:t>// </a:t>
-            </a:r>
-            <a:r>
-              <a:rPr lang="en-US" dirty="0">
-                <a:solidFill>
-                  <a:srgbClr val="008000"/>
-                </a:solidFill>
-                <a:latin typeface="Consolas" panose="020B0609020204030204" pitchFamily="49" charset="0"/>
-              </a:rPr>
-              <a:t>NEW: asynchronous, sequential </a:t>
-            </a:r>
-            <a:r>
-              <a:rPr lang="en-US" dirty="0">
-                <a:solidFill>
-                  <a:srgbClr val="008000"/>
-                </a:solidFill>
-                <a:latin typeface="Consolas" panose="020B0609020204030204" pitchFamily="49" charset="0"/>
-              </a:rPr>
-              <a:t>execution</a:t>
+              <a:t>// NEW: asynchronous, sequential execution</a:t>
             </a:r>
           </a:p>
           <a:p>
@@ -6539,33 +6874,15 @@
                                   </p:childTnLst>
                                 </p:cTn>
                               </p:par>
-                            </p:childTnLst>
-                          </p:cTn>
-                        </p:par>
-                      </p:childTnLst>
-                    </p:cTn>
-                  </p:par>
-                  <p:par>
-                    <p:cTn id="39" fill="hold">
-                      <p:stCondLst>
-                        <p:cond delay="indefinite"/>
-                      </p:stCondLst>
-                      <p:childTnLst>
-                        <p:par>
-                          <p:cTn id="40" fill="hold">
-                            <p:stCondLst>
-                              <p:cond delay="0"/>
-                            </p:stCondLst>
-                            <p:childTnLst>
                               <p:par>
-                                <p:cTn id="41" presetID="2" presetClass="entr" presetSubtype="8" fill="hold" nodeType="clickEffect">
+                                <p:cTn id="39" presetID="2" presetClass="entr" presetSubtype="8" fill="hold" nodeType="withEffect">
                                   <p:stCondLst>
                                     <p:cond delay="0"/>
                                   </p:stCondLst>
                                   <p:childTnLst>
                                     <p:set>
                                       <p:cBhvr>
-                                        <p:cTn id="42" dur="1" fill="hold">
+                                        <p:cTn id="40" dur="1" fill="hold">
                                           <p:stCondLst>
                                             <p:cond delay="0"/>
                                           </p:stCondLst>
@@ -6587,7 +6904,7 @@
                                     </p:set>
                                     <p:anim calcmode="lin" valueType="num">
                                       <p:cBhvr additive="base">
-                                        <p:cTn id="43" dur="500" fill="hold"/>
+                                        <p:cTn id="41" dur="500" fill="hold"/>
                                         <p:tgtEl>
                                           <p:spTgt spid="9">
                                             <p:txEl>
@@ -6614,7 +6931,7 @@
                                     </p:anim>
                                     <p:anim calcmode="lin" valueType="num">
                                       <p:cBhvr additive="base">
-                                        <p:cTn id="44" dur="500" fill="hold"/>
+                                        <p:cTn id="42" dur="500" fill="hold"/>
                                         <p:tgtEl>
                                           <p:spTgt spid="9">
                                             <p:txEl>
@@ -6643,14 +6960,14 @@
                                 </p:cTn>
                               </p:par>
                               <p:par>
-                                <p:cTn id="45" presetID="2" presetClass="entr" presetSubtype="8" fill="hold" nodeType="withEffect">
+                                <p:cTn id="43" presetID="2" presetClass="entr" presetSubtype="8" fill="hold" nodeType="withEffect">
                                   <p:stCondLst>
                                     <p:cond delay="0"/>
                                   </p:stCondLst>
                                   <p:childTnLst>
                                     <p:set>
                                       <p:cBhvr>
-                                        <p:cTn id="46" dur="1" fill="hold">
+                                        <p:cTn id="44" dur="1" fill="hold">
                                           <p:stCondLst>
                                             <p:cond delay="0"/>
                                           </p:stCondLst>
@@ -6672,7 +6989,7 @@
                                     </p:set>
                                     <p:anim calcmode="lin" valueType="num">
                                       <p:cBhvr additive="base">
-                                        <p:cTn id="47" dur="500" fill="hold"/>
+                                        <p:cTn id="45" dur="500" fill="hold"/>
                                         <p:tgtEl>
                                           <p:spTgt spid="9">
                                             <p:txEl>
@@ -6699,7 +7016,7 @@
                                     </p:anim>
                                     <p:anim calcmode="lin" valueType="num">
                                       <p:cBhvr additive="base">
-                                        <p:cTn id="48" dur="500" fill="hold"/>
+                                        <p:cTn id="46" dur="500" fill="hold"/>
                                         <p:tgtEl>
                                           <p:spTgt spid="9">
                                             <p:txEl>
@@ -6728,14 +7045,14 @@
                                 </p:cTn>
                               </p:par>
                               <p:par>
-                                <p:cTn id="49" presetID="2" presetClass="entr" presetSubtype="8" fill="hold" nodeType="withEffect">
+                                <p:cTn id="47" presetID="2" presetClass="entr" presetSubtype="8" fill="hold" nodeType="withEffect">
                                   <p:stCondLst>
                                     <p:cond delay="0"/>
                                   </p:stCondLst>
                                   <p:childTnLst>
                                     <p:set>
                                       <p:cBhvr>
-                                        <p:cTn id="50" dur="1" fill="hold">
+                                        <p:cTn id="48" dur="1" fill="hold">
                                           <p:stCondLst>
                                             <p:cond delay="0"/>
                                           </p:stCondLst>
@@ -6757,7 +7074,7 @@
                                     </p:set>
                                     <p:anim calcmode="lin" valueType="num">
                                       <p:cBhvr additive="base">
-                                        <p:cTn id="51" dur="500" fill="hold"/>
+                                        <p:cTn id="49" dur="500" fill="hold"/>
                                         <p:tgtEl>
                                           <p:spTgt spid="9">
                                             <p:txEl>
@@ -6784,7 +7101,7 @@
                                     </p:anim>
                                     <p:anim calcmode="lin" valueType="num">
                                       <p:cBhvr additive="base">
-                                        <p:cTn id="52" dur="500" fill="hold"/>
+                                        <p:cTn id="50" dur="500" fill="hold"/>
                                         <p:tgtEl>
                                           <p:spTgt spid="9">
                                             <p:txEl>
@@ -6813,14 +7130,14 @@
                                 </p:cTn>
                               </p:par>
                               <p:par>
-                                <p:cTn id="53" presetID="2" presetClass="entr" presetSubtype="8" fill="hold" nodeType="withEffect">
+                                <p:cTn id="51" presetID="2" presetClass="entr" presetSubtype="8" fill="hold" nodeType="withEffect">
                                   <p:stCondLst>
                                     <p:cond delay="0"/>
                                   </p:stCondLst>
                                   <p:childTnLst>
                                     <p:set>
                                       <p:cBhvr>
-                                        <p:cTn id="54" dur="1" fill="hold">
+                                        <p:cTn id="52" dur="1" fill="hold">
                                           <p:stCondLst>
                                             <p:cond delay="0"/>
                                           </p:stCondLst>
@@ -6842,7 +7159,7 @@
                                     </p:set>
                                     <p:anim calcmode="lin" valueType="num">
                                       <p:cBhvr additive="base">
-                                        <p:cTn id="55" dur="500" fill="hold"/>
+                                        <p:cTn id="53" dur="500" fill="hold"/>
                                         <p:tgtEl>
                                           <p:spTgt spid="9">
                                             <p:txEl>
@@ -6869,7 +7186,7 @@
                                     </p:anim>
                                     <p:anim calcmode="lin" valueType="num">
                                       <p:cBhvr additive="base">
-                                        <p:cTn id="56" dur="500" fill="hold"/>
+                                        <p:cTn id="54" dur="500" fill="hold"/>
                                         <p:tgtEl>
                                           <p:spTgt spid="9">
                                             <p:txEl>
@@ -6898,14 +7215,14 @@
                                 </p:cTn>
                               </p:par>
                               <p:par>
-                                <p:cTn id="57" presetID="2" presetClass="entr" presetSubtype="8" fill="hold" nodeType="withEffect">
+                                <p:cTn id="55" presetID="2" presetClass="entr" presetSubtype="8" fill="hold" nodeType="withEffect">
                                   <p:stCondLst>
                                     <p:cond delay="0"/>
                                   </p:stCondLst>
                                   <p:childTnLst>
                                     <p:set>
                                       <p:cBhvr>
-                                        <p:cTn id="58" dur="1" fill="hold">
+                                        <p:cTn id="56" dur="1" fill="hold">
                                           <p:stCondLst>
                                             <p:cond delay="0"/>
                                           </p:stCondLst>
@@ -6927,7 +7244,7 @@
                                     </p:set>
                                     <p:anim calcmode="lin" valueType="num">
                                       <p:cBhvr additive="base">
-                                        <p:cTn id="59" dur="500" fill="hold"/>
+                                        <p:cTn id="57" dur="500" fill="hold"/>
                                         <p:tgtEl>
                                           <p:spTgt spid="9">
                                             <p:txEl>
@@ -6954,7 +7271,7 @@
                                     </p:anim>
                                     <p:anim calcmode="lin" valueType="num">
                                       <p:cBhvr additive="base">
-                                        <p:cTn id="60" dur="500" fill="hold"/>
+                                        <p:cTn id="58" dur="500" fill="hold"/>
                                         <p:tgtEl>
                                           <p:spTgt spid="9">
                                             <p:txEl>
@@ -7032,6 +7349,44 @@
       </p:grpSpPr>
       <p:sp>
         <p:nvSpPr>
+          <p:cNvPr id="7" name="Rectangle 6"/>
+          <p:cNvSpPr/>
+          <p:nvPr/>
+        </p:nvSpPr>
+        <p:spPr>
+          <a:xfrm>
+            <a:off x="800100" y="2286001"/>
+            <a:ext cx="10485120" cy="2495549"/>
+          </a:xfrm>
+          <a:prstGeom prst="rect">
+            <a:avLst/>
+          </a:prstGeom>
+        </p:spPr>
+        <p:style>
+          <a:lnRef idx="1">
+            <a:schemeClr val="accent1"/>
+          </a:lnRef>
+          <a:fillRef idx="2">
+            <a:schemeClr val="accent1"/>
+          </a:fillRef>
+          <a:effectRef idx="1">
+            <a:schemeClr val="accent1"/>
+          </a:effectRef>
+          <a:fontRef idx="minor">
+            <a:schemeClr val="dk1"/>
+          </a:fontRef>
+        </p:style>
+        <p:txBody>
+          <a:bodyPr rtlCol="0" anchor="ctr"/>
+          <a:lstStyle/>
+          <a:p>
+            <a:pPr algn="ctr"/>
+            <a:endParaRPr lang="en-US"/>
+          </a:p>
+        </p:txBody>
+      </p:sp>
+      <p:sp>
+        <p:nvSpPr>
           <p:cNvPr id="2" name="Title 1"/>
           <p:cNvSpPr>
             <a:spLocks noGrp="1"/>
@@ -7040,14 +7395,19 @@
             <p:ph type="title"/>
           </p:nvPr>
         </p:nvSpPr>
-        <p:spPr/>
+        <p:spPr>
+          <a:xfrm>
+            <a:off x="1261872" y="294198"/>
+            <a:ext cx="10023348" cy="1397124"/>
+          </a:xfrm>
+        </p:spPr>
         <p:txBody>
           <a:bodyPr/>
           <a:lstStyle/>
           <a:p>
             <a:r>
               <a:rPr lang="en-US" dirty="0" smtClean="0"/>
-              <a:t>Implementation</a:t>
+              <a:t>Extending Parallel Algorithms (await)</a:t>
             </a:r>
             <a:endParaRPr lang="en-US" dirty="0"/>
           </a:p>
@@ -7060,7 +7420,824 @@
             <a:spLocks noGrp="1"/>
           </p:cNvSpPr>
           <p:nvPr>
-            <p:ph sz="half" idx="1"/>
+            <p:ph idx="1"/>
+          </p:nvPr>
+        </p:nvSpPr>
+        <p:spPr>
+          <a:xfrm>
+            <a:off x="1261872" y="1828800"/>
+            <a:ext cx="9863328" cy="4351337"/>
+          </a:xfrm>
+        </p:spPr>
+        <p:txBody>
+          <a:bodyPr>
+            <a:normAutofit/>
+          </a:bodyPr>
+          <a:lstStyle/>
+          <a:p>
+            <a:r>
+              <a:rPr lang="en-US" dirty="0" smtClean="0"/>
+              <a:t>New algorithm: </a:t>
+            </a:r>
+            <a:r>
+              <a:rPr lang="en-US" dirty="0" err="1" smtClean="0"/>
+              <a:t>gather_async</a:t>
+            </a:r>
+            <a:endParaRPr lang="en-US" dirty="0" smtClean="0"/>
+          </a:p>
+          <a:p>
+            <a:pPr marL="914400" lvl="2" indent="0">
+              <a:buNone/>
+            </a:pPr>
+            <a:endParaRPr lang="en-US" sz="1200" dirty="0" smtClean="0">
+              <a:effectLst/>
+              <a:latin typeface="Consolas" panose="020B0609020204030204" pitchFamily="49" charset="0"/>
+              <a:cs typeface="Consolas" panose="020B0609020204030204" pitchFamily="49" charset="0"/>
+            </a:endParaRPr>
+          </a:p>
+          <a:p>
+            <a:pPr marL="227013" lvl="2" indent="0">
+              <a:buNone/>
+            </a:pPr>
+            <a:r>
+              <a:rPr lang="en-US" dirty="0" smtClean="0">
+                <a:solidFill>
+                  <a:schemeClr val="tx1"/>
+                </a:solidFill>
+                <a:effectLst/>
+                <a:latin typeface="Consolas" panose="020B0609020204030204" pitchFamily="49" charset="0"/>
+                <a:cs typeface="Consolas" panose="020B0609020204030204" pitchFamily="49" charset="0"/>
+              </a:rPr>
+              <a:t>template </a:t>
+            </a:r>
+            <a:r>
+              <a:rPr lang="en-US" dirty="0">
+                <a:solidFill>
+                  <a:schemeClr val="tx1"/>
+                </a:solidFill>
+                <a:effectLst/>
+                <a:latin typeface="Consolas" panose="020B0609020204030204" pitchFamily="49" charset="0"/>
+                <a:cs typeface="Consolas" panose="020B0609020204030204" pitchFamily="49" charset="0"/>
+              </a:rPr>
+              <a:t>&lt;</a:t>
+            </a:r>
+            <a:r>
+              <a:rPr lang="en-US" dirty="0" err="1">
+                <a:solidFill>
+                  <a:schemeClr val="tx1"/>
+                </a:solidFill>
+                <a:effectLst/>
+                <a:latin typeface="Consolas" panose="020B0609020204030204" pitchFamily="49" charset="0"/>
+                <a:cs typeface="Consolas" panose="020B0609020204030204" pitchFamily="49" charset="0"/>
+              </a:rPr>
+              <a:t>typename</a:t>
+            </a:r>
+            <a:r>
+              <a:rPr lang="en-US" dirty="0">
+                <a:solidFill>
+                  <a:schemeClr val="tx1"/>
+                </a:solidFill>
+                <a:effectLst/>
+                <a:latin typeface="Consolas" panose="020B0609020204030204" pitchFamily="49" charset="0"/>
+                <a:cs typeface="Consolas" panose="020B0609020204030204" pitchFamily="49" charset="0"/>
+              </a:rPr>
+              <a:t> </a:t>
+            </a:r>
+            <a:r>
+              <a:rPr lang="en-US" dirty="0" err="1">
+                <a:solidFill>
+                  <a:schemeClr val="tx1"/>
+                </a:solidFill>
+                <a:effectLst/>
+                <a:latin typeface="Consolas" panose="020B0609020204030204" pitchFamily="49" charset="0"/>
+                <a:cs typeface="Consolas" panose="020B0609020204030204" pitchFamily="49" charset="0"/>
+              </a:rPr>
+              <a:t>BiIter</a:t>
+            </a:r>
+            <a:r>
+              <a:rPr lang="en-US" dirty="0" smtClean="0">
+                <a:solidFill>
+                  <a:schemeClr val="tx1"/>
+                </a:solidFill>
+                <a:effectLst/>
+                <a:latin typeface="Consolas" panose="020B0609020204030204" pitchFamily="49" charset="0"/>
+                <a:cs typeface="Consolas" panose="020B0609020204030204" pitchFamily="49" charset="0"/>
+              </a:rPr>
+              <a:t>, </a:t>
+            </a:r>
+            <a:r>
+              <a:rPr lang="en-US" dirty="0" err="1">
+                <a:solidFill>
+                  <a:schemeClr val="tx1"/>
+                </a:solidFill>
+                <a:effectLst/>
+                <a:latin typeface="Consolas" panose="020B0609020204030204" pitchFamily="49" charset="0"/>
+                <a:cs typeface="Consolas" panose="020B0609020204030204" pitchFamily="49" charset="0"/>
+              </a:rPr>
+              <a:t>typename</a:t>
+            </a:r>
+            <a:r>
+              <a:rPr lang="en-US" dirty="0">
+                <a:solidFill>
+                  <a:schemeClr val="tx1"/>
+                </a:solidFill>
+                <a:effectLst/>
+                <a:latin typeface="Consolas" panose="020B0609020204030204" pitchFamily="49" charset="0"/>
+                <a:cs typeface="Consolas" panose="020B0609020204030204" pitchFamily="49" charset="0"/>
+              </a:rPr>
+              <a:t> </a:t>
+            </a:r>
+            <a:r>
+              <a:rPr lang="en-US" dirty="0" err="1" smtClean="0">
+                <a:solidFill>
+                  <a:schemeClr val="tx1"/>
+                </a:solidFill>
+                <a:effectLst/>
+                <a:latin typeface="Consolas" panose="020B0609020204030204" pitchFamily="49" charset="0"/>
+                <a:cs typeface="Consolas" panose="020B0609020204030204" pitchFamily="49" charset="0"/>
+              </a:rPr>
+              <a:t>Pred</a:t>
+            </a:r>
+            <a:r>
+              <a:rPr lang="en-US" dirty="0" smtClean="0">
+                <a:solidFill>
+                  <a:schemeClr val="tx1"/>
+                </a:solidFill>
+                <a:effectLst/>
+                <a:latin typeface="Consolas" panose="020B0609020204030204" pitchFamily="49" charset="0"/>
+                <a:cs typeface="Consolas" panose="020B0609020204030204" pitchFamily="49" charset="0"/>
+              </a:rPr>
+              <a:t>&gt;</a:t>
+            </a:r>
+            <a:endParaRPr lang="en-US" dirty="0">
+              <a:solidFill>
+                <a:schemeClr val="tx1"/>
+              </a:solidFill>
+              <a:effectLst/>
+              <a:latin typeface="Consolas" panose="020B0609020204030204" pitchFamily="49" charset="0"/>
+              <a:cs typeface="Consolas" panose="020B0609020204030204" pitchFamily="49" charset="0"/>
+            </a:endParaRPr>
+          </a:p>
+          <a:p>
+            <a:pPr marL="227013" lvl="2" indent="0">
+              <a:buNone/>
+            </a:pPr>
+            <a:r>
+              <a:rPr lang="en-US" dirty="0">
+                <a:solidFill>
+                  <a:schemeClr val="tx1"/>
+                </a:solidFill>
+                <a:effectLst/>
+                <a:latin typeface="Consolas" panose="020B0609020204030204" pitchFamily="49" charset="0"/>
+                <a:cs typeface="Consolas" panose="020B0609020204030204" pitchFamily="49" charset="0"/>
+              </a:rPr>
+              <a:t>future&lt;pair&lt;</a:t>
+            </a:r>
+            <a:r>
+              <a:rPr lang="en-US" dirty="0" err="1">
+                <a:solidFill>
+                  <a:schemeClr val="tx1"/>
+                </a:solidFill>
+                <a:effectLst/>
+                <a:latin typeface="Consolas" panose="020B0609020204030204" pitchFamily="49" charset="0"/>
+                <a:cs typeface="Consolas" panose="020B0609020204030204" pitchFamily="49" charset="0"/>
+              </a:rPr>
+              <a:t>BiIter</a:t>
+            </a:r>
+            <a:r>
+              <a:rPr lang="en-US" dirty="0">
+                <a:solidFill>
+                  <a:schemeClr val="tx1"/>
+                </a:solidFill>
+                <a:effectLst/>
+                <a:latin typeface="Consolas" panose="020B0609020204030204" pitchFamily="49" charset="0"/>
+                <a:cs typeface="Consolas" panose="020B0609020204030204" pitchFamily="49" charset="0"/>
+              </a:rPr>
+              <a:t>, </a:t>
+            </a:r>
+            <a:r>
+              <a:rPr lang="en-US" dirty="0" err="1">
+                <a:solidFill>
+                  <a:schemeClr val="tx1"/>
+                </a:solidFill>
+                <a:effectLst/>
+                <a:latin typeface="Consolas" panose="020B0609020204030204" pitchFamily="49" charset="0"/>
+                <a:cs typeface="Consolas" panose="020B0609020204030204" pitchFamily="49" charset="0"/>
+              </a:rPr>
+              <a:t>BiIter</a:t>
+            </a:r>
+            <a:r>
+              <a:rPr lang="en-US" dirty="0">
+                <a:solidFill>
+                  <a:schemeClr val="tx1"/>
+                </a:solidFill>
+                <a:effectLst/>
+                <a:latin typeface="Consolas" panose="020B0609020204030204" pitchFamily="49" charset="0"/>
+                <a:cs typeface="Consolas" panose="020B0609020204030204" pitchFamily="49" charset="0"/>
+              </a:rPr>
+              <a:t>&gt;&gt; </a:t>
+            </a:r>
+            <a:r>
+              <a:rPr lang="en-US" dirty="0" err="1" smtClean="0">
+                <a:solidFill>
+                  <a:schemeClr val="tx1"/>
+                </a:solidFill>
+                <a:effectLst/>
+                <a:latin typeface="Consolas" panose="020B0609020204030204" pitchFamily="49" charset="0"/>
+                <a:cs typeface="Consolas" panose="020B0609020204030204" pitchFamily="49" charset="0"/>
+              </a:rPr>
+              <a:t>gather_async</a:t>
+            </a:r>
+            <a:r>
+              <a:rPr lang="en-US" dirty="0" smtClean="0">
+                <a:solidFill>
+                  <a:schemeClr val="tx1"/>
+                </a:solidFill>
+                <a:effectLst/>
+                <a:latin typeface="Consolas" panose="020B0609020204030204" pitchFamily="49" charset="0"/>
+                <a:cs typeface="Consolas" panose="020B0609020204030204" pitchFamily="49" charset="0"/>
+              </a:rPr>
+              <a:t>(</a:t>
+            </a:r>
+            <a:r>
+              <a:rPr lang="en-US" dirty="0" err="1" smtClean="0">
+                <a:solidFill>
+                  <a:schemeClr val="tx1"/>
+                </a:solidFill>
+                <a:effectLst/>
+                <a:latin typeface="Consolas" panose="020B0609020204030204" pitchFamily="49" charset="0"/>
+                <a:cs typeface="Consolas" panose="020B0609020204030204" pitchFamily="49" charset="0"/>
+              </a:rPr>
+              <a:t>BiIter</a:t>
+            </a:r>
+            <a:r>
+              <a:rPr lang="en-US" dirty="0" smtClean="0">
+                <a:solidFill>
+                  <a:schemeClr val="tx1"/>
+                </a:solidFill>
+                <a:effectLst/>
+                <a:latin typeface="Consolas" panose="020B0609020204030204" pitchFamily="49" charset="0"/>
+                <a:cs typeface="Consolas" panose="020B0609020204030204" pitchFamily="49" charset="0"/>
+              </a:rPr>
+              <a:t> </a:t>
+            </a:r>
+            <a:r>
+              <a:rPr lang="en-US" dirty="0">
+                <a:solidFill>
+                  <a:schemeClr val="tx1"/>
+                </a:solidFill>
+                <a:effectLst/>
+                <a:latin typeface="Consolas" panose="020B0609020204030204" pitchFamily="49" charset="0"/>
+                <a:cs typeface="Consolas" panose="020B0609020204030204" pitchFamily="49" charset="0"/>
+              </a:rPr>
+              <a:t>f, </a:t>
+            </a:r>
+            <a:r>
+              <a:rPr lang="en-US" dirty="0" err="1">
+                <a:solidFill>
+                  <a:schemeClr val="tx1"/>
+                </a:solidFill>
+                <a:effectLst/>
+                <a:latin typeface="Consolas" panose="020B0609020204030204" pitchFamily="49" charset="0"/>
+                <a:cs typeface="Consolas" panose="020B0609020204030204" pitchFamily="49" charset="0"/>
+              </a:rPr>
+              <a:t>BiIter</a:t>
+            </a:r>
+            <a:r>
+              <a:rPr lang="en-US" dirty="0" smtClean="0">
+                <a:solidFill>
+                  <a:schemeClr val="tx1"/>
+                </a:solidFill>
+                <a:effectLst/>
+                <a:latin typeface="Consolas" panose="020B0609020204030204" pitchFamily="49" charset="0"/>
+                <a:cs typeface="Consolas" panose="020B0609020204030204" pitchFamily="49" charset="0"/>
+              </a:rPr>
+              <a:t> </a:t>
+            </a:r>
+            <a:r>
+              <a:rPr lang="en-US" dirty="0">
+                <a:solidFill>
+                  <a:schemeClr val="tx1"/>
+                </a:solidFill>
+                <a:effectLst/>
+                <a:latin typeface="Consolas" panose="020B0609020204030204" pitchFamily="49" charset="0"/>
+                <a:cs typeface="Consolas" panose="020B0609020204030204" pitchFamily="49" charset="0"/>
+              </a:rPr>
+              <a:t>l, </a:t>
+            </a:r>
+            <a:r>
+              <a:rPr lang="en-US" dirty="0" err="1">
+                <a:solidFill>
+                  <a:schemeClr val="tx1"/>
+                </a:solidFill>
+                <a:effectLst/>
+                <a:latin typeface="Consolas" panose="020B0609020204030204" pitchFamily="49" charset="0"/>
+                <a:cs typeface="Consolas" panose="020B0609020204030204" pitchFamily="49" charset="0"/>
+              </a:rPr>
+              <a:t>BiIter</a:t>
+            </a:r>
+            <a:r>
+              <a:rPr lang="en-US" dirty="0" smtClean="0">
+                <a:solidFill>
+                  <a:schemeClr val="tx1"/>
+                </a:solidFill>
+                <a:effectLst/>
+                <a:latin typeface="Consolas" panose="020B0609020204030204" pitchFamily="49" charset="0"/>
+                <a:cs typeface="Consolas" panose="020B0609020204030204" pitchFamily="49" charset="0"/>
+              </a:rPr>
+              <a:t> </a:t>
+            </a:r>
+            <a:r>
+              <a:rPr lang="en-US" dirty="0">
+                <a:solidFill>
+                  <a:schemeClr val="tx1"/>
+                </a:solidFill>
+                <a:effectLst/>
+                <a:latin typeface="Consolas" panose="020B0609020204030204" pitchFamily="49" charset="0"/>
+                <a:cs typeface="Consolas" panose="020B0609020204030204" pitchFamily="49" charset="0"/>
+              </a:rPr>
+              <a:t>p, </a:t>
+            </a:r>
+            <a:r>
+              <a:rPr lang="en-US" dirty="0" err="1" smtClean="0">
+                <a:solidFill>
+                  <a:schemeClr val="tx1"/>
+                </a:solidFill>
+                <a:effectLst/>
+                <a:latin typeface="Consolas" panose="020B0609020204030204" pitchFamily="49" charset="0"/>
+                <a:cs typeface="Consolas" panose="020B0609020204030204" pitchFamily="49" charset="0"/>
+              </a:rPr>
+              <a:t>Pred</a:t>
+            </a:r>
+            <a:r>
+              <a:rPr lang="en-US" dirty="0" smtClean="0">
+                <a:solidFill>
+                  <a:schemeClr val="tx1"/>
+                </a:solidFill>
+                <a:effectLst/>
+                <a:latin typeface="Consolas" panose="020B0609020204030204" pitchFamily="49" charset="0"/>
+                <a:cs typeface="Consolas" panose="020B0609020204030204" pitchFamily="49" charset="0"/>
+              </a:rPr>
+              <a:t> </a:t>
+            </a:r>
+            <a:r>
+              <a:rPr lang="en-US" dirty="0" err="1" smtClean="0">
+                <a:solidFill>
+                  <a:schemeClr val="tx1"/>
+                </a:solidFill>
+                <a:effectLst/>
+                <a:latin typeface="Consolas" panose="020B0609020204030204" pitchFamily="49" charset="0"/>
+                <a:cs typeface="Consolas" panose="020B0609020204030204" pitchFamily="49" charset="0"/>
+              </a:rPr>
+              <a:t>pred</a:t>
+            </a:r>
+            <a:r>
+              <a:rPr lang="en-US" dirty="0" smtClean="0">
+                <a:solidFill>
+                  <a:schemeClr val="tx1"/>
+                </a:solidFill>
+                <a:effectLst/>
+                <a:latin typeface="Consolas" panose="020B0609020204030204" pitchFamily="49" charset="0"/>
+                <a:cs typeface="Consolas" panose="020B0609020204030204" pitchFamily="49" charset="0"/>
+              </a:rPr>
+              <a:t>)</a:t>
+            </a:r>
+            <a:endParaRPr lang="en-US" dirty="0">
+              <a:solidFill>
+                <a:schemeClr val="tx1"/>
+              </a:solidFill>
+              <a:effectLst/>
+              <a:latin typeface="Consolas" panose="020B0609020204030204" pitchFamily="49" charset="0"/>
+              <a:cs typeface="Consolas" panose="020B0609020204030204" pitchFamily="49" charset="0"/>
+            </a:endParaRPr>
+          </a:p>
+          <a:p>
+            <a:pPr marL="227013" lvl="2" indent="0">
+              <a:buNone/>
+            </a:pPr>
+            <a:r>
+              <a:rPr lang="en-US" dirty="0" smtClean="0">
+                <a:solidFill>
+                  <a:schemeClr val="tx1"/>
+                </a:solidFill>
+                <a:effectLst/>
+                <a:latin typeface="Consolas" panose="020B0609020204030204" pitchFamily="49" charset="0"/>
+                <a:cs typeface="Consolas" panose="020B0609020204030204" pitchFamily="49" charset="0"/>
+              </a:rPr>
+              <a:t>{</a:t>
+            </a:r>
+          </a:p>
+          <a:p>
+            <a:pPr marL="227013" lvl="2" indent="0">
+              <a:buNone/>
+            </a:pPr>
+            <a:r>
+              <a:rPr lang="en-US" dirty="0">
+                <a:solidFill>
+                  <a:schemeClr val="tx1"/>
+                </a:solidFill>
+                <a:latin typeface="Consolas" panose="020B0609020204030204" pitchFamily="49" charset="0"/>
+                <a:cs typeface="Consolas" panose="020B0609020204030204" pitchFamily="49" charset="0"/>
+              </a:rPr>
+              <a:t> </a:t>
+            </a:r>
+            <a:r>
+              <a:rPr lang="en-US" dirty="0" smtClean="0">
+                <a:solidFill>
+                  <a:schemeClr val="tx1"/>
+                </a:solidFill>
+                <a:latin typeface="Consolas" panose="020B0609020204030204" pitchFamily="49" charset="0"/>
+                <a:cs typeface="Consolas" panose="020B0609020204030204" pitchFamily="49" charset="0"/>
+              </a:rPr>
+              <a:t>   future&lt;</a:t>
+            </a:r>
+            <a:r>
+              <a:rPr lang="en-US" dirty="0" err="1" smtClean="0">
+                <a:solidFill>
+                  <a:schemeClr val="tx1"/>
+                </a:solidFill>
+                <a:latin typeface="Consolas" panose="020B0609020204030204" pitchFamily="49" charset="0"/>
+                <a:cs typeface="Consolas" panose="020B0609020204030204" pitchFamily="49" charset="0"/>
+              </a:rPr>
+              <a:t>BiIter</a:t>
+            </a:r>
+            <a:r>
+              <a:rPr lang="en-US" dirty="0" smtClean="0">
+                <a:solidFill>
+                  <a:schemeClr val="tx1"/>
+                </a:solidFill>
+                <a:latin typeface="Consolas" panose="020B0609020204030204" pitchFamily="49" charset="0"/>
+                <a:cs typeface="Consolas" panose="020B0609020204030204" pitchFamily="49" charset="0"/>
+              </a:rPr>
+              <a:t>&gt; f1 = </a:t>
+            </a:r>
+            <a:r>
+              <a:rPr lang="en-US" dirty="0">
+                <a:solidFill>
+                  <a:schemeClr val="tx1"/>
+                </a:solidFill>
+                <a:latin typeface="Consolas" panose="020B0609020204030204" pitchFamily="49" charset="0"/>
+                <a:cs typeface="Consolas" panose="020B0609020204030204" pitchFamily="49" charset="0"/>
+              </a:rPr>
+              <a:t>parallel::</a:t>
+            </a:r>
+            <a:r>
+              <a:rPr lang="en-US" dirty="0" err="1">
+                <a:solidFill>
+                  <a:schemeClr val="tx1"/>
+                </a:solidFill>
+                <a:latin typeface="Consolas" panose="020B0609020204030204" pitchFamily="49" charset="0"/>
+                <a:cs typeface="Consolas" panose="020B0609020204030204" pitchFamily="49" charset="0"/>
+              </a:rPr>
+              <a:t>stable_partition</a:t>
+            </a:r>
+            <a:r>
+              <a:rPr lang="en-US" dirty="0">
+                <a:solidFill>
+                  <a:schemeClr val="tx1"/>
+                </a:solidFill>
+                <a:latin typeface="Consolas" panose="020B0609020204030204" pitchFamily="49" charset="0"/>
+                <a:cs typeface="Consolas" panose="020B0609020204030204" pitchFamily="49" charset="0"/>
+              </a:rPr>
+              <a:t>(par(task), f, p, not1(</a:t>
+            </a:r>
+            <a:r>
+              <a:rPr lang="en-US" dirty="0" err="1">
+                <a:solidFill>
+                  <a:schemeClr val="tx1"/>
+                </a:solidFill>
+                <a:latin typeface="Consolas" panose="020B0609020204030204" pitchFamily="49" charset="0"/>
+                <a:cs typeface="Consolas" panose="020B0609020204030204" pitchFamily="49" charset="0"/>
+              </a:rPr>
+              <a:t>pred</a:t>
+            </a:r>
+            <a:r>
+              <a:rPr lang="en-US" dirty="0" smtClean="0">
+                <a:solidFill>
+                  <a:schemeClr val="tx1"/>
+                </a:solidFill>
+                <a:latin typeface="Consolas" panose="020B0609020204030204" pitchFamily="49" charset="0"/>
+                <a:cs typeface="Consolas" panose="020B0609020204030204" pitchFamily="49" charset="0"/>
+              </a:rPr>
+              <a:t>));</a:t>
+            </a:r>
+          </a:p>
+          <a:p>
+            <a:pPr marL="227013" lvl="2" indent="0">
+              <a:buNone/>
+            </a:pPr>
+            <a:r>
+              <a:rPr lang="en-US" dirty="0" smtClean="0">
+                <a:solidFill>
+                  <a:schemeClr val="tx1"/>
+                </a:solidFill>
+                <a:latin typeface="Consolas" panose="020B0609020204030204" pitchFamily="49" charset="0"/>
+                <a:cs typeface="Consolas" panose="020B0609020204030204" pitchFamily="49" charset="0"/>
+              </a:rPr>
+              <a:t>    </a:t>
+            </a:r>
+            <a:r>
+              <a:rPr lang="en-US" dirty="0">
+                <a:solidFill>
+                  <a:schemeClr val="tx1"/>
+                </a:solidFill>
+                <a:latin typeface="Consolas" panose="020B0609020204030204" pitchFamily="49" charset="0"/>
+                <a:cs typeface="Consolas" panose="020B0609020204030204" pitchFamily="49" charset="0"/>
+              </a:rPr>
+              <a:t>future&lt;</a:t>
+            </a:r>
+            <a:r>
+              <a:rPr lang="en-US" dirty="0" err="1">
+                <a:solidFill>
+                  <a:schemeClr val="tx1"/>
+                </a:solidFill>
+                <a:latin typeface="Consolas" panose="020B0609020204030204" pitchFamily="49" charset="0"/>
+                <a:cs typeface="Consolas" panose="020B0609020204030204" pitchFamily="49" charset="0"/>
+              </a:rPr>
+              <a:t>BiIter</a:t>
+            </a:r>
+            <a:r>
+              <a:rPr lang="en-US" dirty="0">
+                <a:solidFill>
+                  <a:schemeClr val="tx1"/>
+                </a:solidFill>
+                <a:latin typeface="Consolas" panose="020B0609020204030204" pitchFamily="49" charset="0"/>
+                <a:cs typeface="Consolas" panose="020B0609020204030204" pitchFamily="49" charset="0"/>
+              </a:rPr>
+              <a:t>&gt; </a:t>
+            </a:r>
+            <a:r>
+              <a:rPr lang="en-US" dirty="0" smtClean="0">
+                <a:solidFill>
+                  <a:schemeClr val="tx1"/>
+                </a:solidFill>
+                <a:latin typeface="Consolas" panose="020B0609020204030204" pitchFamily="49" charset="0"/>
+                <a:cs typeface="Consolas" panose="020B0609020204030204" pitchFamily="49" charset="0"/>
+              </a:rPr>
+              <a:t>f2 </a:t>
+            </a:r>
+            <a:r>
+              <a:rPr lang="en-US" dirty="0">
+                <a:solidFill>
+                  <a:schemeClr val="tx1"/>
+                </a:solidFill>
+                <a:latin typeface="Consolas" panose="020B0609020204030204" pitchFamily="49" charset="0"/>
+                <a:cs typeface="Consolas" panose="020B0609020204030204" pitchFamily="49" charset="0"/>
+              </a:rPr>
+              <a:t>= parallel::</a:t>
+            </a:r>
+            <a:r>
+              <a:rPr lang="en-US" dirty="0" err="1">
+                <a:solidFill>
+                  <a:schemeClr val="tx1"/>
+                </a:solidFill>
+                <a:latin typeface="Consolas" panose="020B0609020204030204" pitchFamily="49" charset="0"/>
+                <a:cs typeface="Consolas" panose="020B0609020204030204" pitchFamily="49" charset="0"/>
+              </a:rPr>
+              <a:t>stable_partition</a:t>
+            </a:r>
+            <a:r>
+              <a:rPr lang="en-US" dirty="0">
+                <a:solidFill>
+                  <a:schemeClr val="tx1"/>
+                </a:solidFill>
+                <a:latin typeface="Consolas" panose="020B0609020204030204" pitchFamily="49" charset="0"/>
+                <a:cs typeface="Consolas" panose="020B0609020204030204" pitchFamily="49" charset="0"/>
+              </a:rPr>
+              <a:t>(par(task), </a:t>
+            </a:r>
+            <a:r>
+              <a:rPr lang="en-US" dirty="0" smtClean="0">
+                <a:solidFill>
+                  <a:schemeClr val="tx1"/>
+                </a:solidFill>
+                <a:latin typeface="Consolas" panose="020B0609020204030204" pitchFamily="49" charset="0"/>
+                <a:cs typeface="Consolas" panose="020B0609020204030204" pitchFamily="49" charset="0"/>
+              </a:rPr>
+              <a:t>p, l, </a:t>
+            </a:r>
+            <a:r>
+              <a:rPr lang="en-US" dirty="0" err="1" smtClean="0">
+                <a:solidFill>
+                  <a:schemeClr val="tx1"/>
+                </a:solidFill>
+                <a:latin typeface="Consolas" panose="020B0609020204030204" pitchFamily="49" charset="0"/>
+                <a:cs typeface="Consolas" panose="020B0609020204030204" pitchFamily="49" charset="0"/>
+              </a:rPr>
+              <a:t>pred</a:t>
+            </a:r>
+            <a:r>
+              <a:rPr lang="en-US" dirty="0" smtClean="0">
+                <a:solidFill>
+                  <a:schemeClr val="tx1"/>
+                </a:solidFill>
+                <a:latin typeface="Consolas" panose="020B0609020204030204" pitchFamily="49" charset="0"/>
+                <a:cs typeface="Consolas" panose="020B0609020204030204" pitchFamily="49" charset="0"/>
+              </a:rPr>
+              <a:t>);</a:t>
+            </a:r>
+            <a:endParaRPr lang="en-US" dirty="0">
+              <a:solidFill>
+                <a:schemeClr val="tx1"/>
+              </a:solidFill>
+              <a:effectLst/>
+              <a:latin typeface="Consolas" panose="020B0609020204030204" pitchFamily="49" charset="0"/>
+              <a:cs typeface="Consolas" panose="020B0609020204030204" pitchFamily="49" charset="0"/>
+            </a:endParaRPr>
+          </a:p>
+          <a:p>
+            <a:pPr marL="227013" lvl="2" indent="0">
+              <a:buNone/>
+            </a:pPr>
+            <a:r>
+              <a:rPr lang="en-US" dirty="0">
+                <a:solidFill>
+                  <a:schemeClr val="tx1"/>
+                </a:solidFill>
+                <a:effectLst/>
+                <a:latin typeface="Consolas" panose="020B0609020204030204" pitchFamily="49" charset="0"/>
+                <a:cs typeface="Consolas" panose="020B0609020204030204" pitchFamily="49" charset="0"/>
+              </a:rPr>
+              <a:t>    </a:t>
+            </a:r>
+            <a:r>
+              <a:rPr lang="en-US" dirty="0" err="1">
+                <a:solidFill>
+                  <a:schemeClr val="accent2">
+                    <a:lumMod val="75000"/>
+                  </a:schemeClr>
+                </a:solidFill>
+                <a:latin typeface="Consolas" panose="020B0609020204030204" pitchFamily="49" charset="0"/>
+                <a:cs typeface="Consolas" panose="020B0609020204030204" pitchFamily="49" charset="0"/>
+              </a:rPr>
+              <a:t>co_return</a:t>
+            </a:r>
+            <a:r>
+              <a:rPr lang="en-US" dirty="0" smtClean="0">
+                <a:solidFill>
+                  <a:schemeClr val="tx1"/>
+                </a:solidFill>
+                <a:effectLst/>
+                <a:latin typeface="Consolas" panose="020B0609020204030204" pitchFamily="49" charset="0"/>
+                <a:cs typeface="Consolas" panose="020B0609020204030204" pitchFamily="49" charset="0"/>
+              </a:rPr>
+              <a:t> </a:t>
+            </a:r>
+            <a:r>
+              <a:rPr lang="en-US" dirty="0" err="1" smtClean="0">
+                <a:solidFill>
+                  <a:schemeClr val="tx1"/>
+                </a:solidFill>
+                <a:effectLst/>
+                <a:latin typeface="Consolas" panose="020B0609020204030204" pitchFamily="49" charset="0"/>
+                <a:cs typeface="Consolas" panose="020B0609020204030204" pitchFamily="49" charset="0"/>
+              </a:rPr>
+              <a:t>make_pair</a:t>
+            </a:r>
+            <a:r>
+              <a:rPr lang="en-US" dirty="0" smtClean="0">
+                <a:solidFill>
+                  <a:schemeClr val="tx1"/>
+                </a:solidFill>
+                <a:effectLst/>
+                <a:latin typeface="Consolas" panose="020B0609020204030204" pitchFamily="49" charset="0"/>
+                <a:cs typeface="Consolas" panose="020B0609020204030204" pitchFamily="49" charset="0"/>
+              </a:rPr>
+              <a:t>(</a:t>
+            </a:r>
+            <a:r>
+              <a:rPr lang="en-US" dirty="0" err="1" smtClean="0">
+                <a:solidFill>
+                  <a:schemeClr val="accent2">
+                    <a:lumMod val="75000"/>
+                  </a:schemeClr>
+                </a:solidFill>
+                <a:effectLst/>
+                <a:latin typeface="Consolas" panose="020B0609020204030204" pitchFamily="49" charset="0"/>
+                <a:cs typeface="Consolas" panose="020B0609020204030204" pitchFamily="49" charset="0"/>
+              </a:rPr>
+              <a:t>co_await</a:t>
+            </a:r>
+            <a:r>
+              <a:rPr lang="en-US" dirty="0" smtClean="0">
+                <a:solidFill>
+                  <a:schemeClr val="accent2">
+                    <a:lumMod val="75000"/>
+                  </a:schemeClr>
+                </a:solidFill>
+                <a:effectLst/>
+                <a:latin typeface="Consolas" panose="020B0609020204030204" pitchFamily="49" charset="0"/>
+                <a:cs typeface="Consolas" panose="020B0609020204030204" pitchFamily="49" charset="0"/>
+              </a:rPr>
+              <a:t> </a:t>
+            </a:r>
+            <a:r>
+              <a:rPr lang="en-US" dirty="0" smtClean="0">
+                <a:solidFill>
+                  <a:schemeClr val="tx1"/>
+                </a:solidFill>
+                <a:effectLst/>
+                <a:latin typeface="Consolas" panose="020B0609020204030204" pitchFamily="49" charset="0"/>
+                <a:cs typeface="Consolas" panose="020B0609020204030204" pitchFamily="49" charset="0"/>
+              </a:rPr>
+              <a:t>f1, </a:t>
+            </a:r>
+            <a:r>
+              <a:rPr lang="en-US" dirty="0" err="1" smtClean="0">
+                <a:solidFill>
+                  <a:schemeClr val="accent2">
+                    <a:lumMod val="75000"/>
+                  </a:schemeClr>
+                </a:solidFill>
+                <a:effectLst/>
+                <a:latin typeface="Consolas" panose="020B0609020204030204" pitchFamily="49" charset="0"/>
+                <a:cs typeface="Consolas" panose="020B0609020204030204" pitchFamily="49" charset="0"/>
+              </a:rPr>
+              <a:t>co_await</a:t>
+            </a:r>
+            <a:r>
+              <a:rPr lang="en-US" dirty="0" smtClean="0">
+                <a:solidFill>
+                  <a:schemeClr val="accent2">
+                    <a:lumMod val="75000"/>
+                  </a:schemeClr>
+                </a:solidFill>
+                <a:effectLst/>
+                <a:latin typeface="Consolas" panose="020B0609020204030204" pitchFamily="49" charset="0"/>
+                <a:cs typeface="Consolas" panose="020B0609020204030204" pitchFamily="49" charset="0"/>
+              </a:rPr>
+              <a:t> </a:t>
+            </a:r>
+            <a:r>
+              <a:rPr lang="en-US" dirty="0" smtClean="0">
+                <a:solidFill>
+                  <a:schemeClr val="tx1"/>
+                </a:solidFill>
+                <a:effectLst/>
+                <a:latin typeface="Consolas" panose="020B0609020204030204" pitchFamily="49" charset="0"/>
+                <a:cs typeface="Consolas" panose="020B0609020204030204" pitchFamily="49" charset="0"/>
+              </a:rPr>
+              <a:t>f2</a:t>
+            </a:r>
+            <a:r>
+              <a:rPr lang="en-US" dirty="0" smtClean="0">
+                <a:solidFill>
+                  <a:schemeClr val="tx1"/>
+                </a:solidFill>
+                <a:latin typeface="Consolas" panose="020B0609020204030204" pitchFamily="49" charset="0"/>
+                <a:cs typeface="Consolas" panose="020B0609020204030204" pitchFamily="49" charset="0"/>
+              </a:rPr>
+              <a:t>)</a:t>
+            </a:r>
+            <a:r>
+              <a:rPr lang="en-US" dirty="0" smtClean="0">
+                <a:solidFill>
+                  <a:schemeClr val="tx1"/>
+                </a:solidFill>
+                <a:effectLst/>
+                <a:latin typeface="Consolas" panose="020B0609020204030204" pitchFamily="49" charset="0"/>
+                <a:cs typeface="Consolas" panose="020B0609020204030204" pitchFamily="49" charset="0"/>
+              </a:rPr>
+              <a:t>;</a:t>
+            </a:r>
+          </a:p>
+          <a:p>
+            <a:pPr marL="227013" lvl="2" indent="0">
+              <a:buNone/>
+            </a:pPr>
+            <a:r>
+              <a:rPr lang="en-US" dirty="0" smtClean="0">
+                <a:solidFill>
+                  <a:schemeClr val="tx1"/>
+                </a:solidFill>
+                <a:effectLst/>
+                <a:latin typeface="Consolas" panose="020B0609020204030204" pitchFamily="49" charset="0"/>
+                <a:cs typeface="Consolas" panose="020B0609020204030204" pitchFamily="49" charset="0"/>
+              </a:rPr>
+              <a:t>}</a:t>
+            </a:r>
+            <a:endParaRPr lang="en-US" dirty="0">
+              <a:solidFill>
+                <a:schemeClr val="tx1"/>
+              </a:solidFill>
+              <a:effectLst/>
+              <a:latin typeface="Consolas" panose="020B0609020204030204" pitchFamily="49" charset="0"/>
+              <a:cs typeface="Consolas" panose="020B0609020204030204" pitchFamily="49" charset="0"/>
+            </a:endParaRPr>
+          </a:p>
+          <a:p>
+            <a:endParaRPr lang="en-US" dirty="0"/>
+          </a:p>
+        </p:txBody>
+      </p:sp>
+      <p:sp>
+        <p:nvSpPr>
+          <p:cNvPr id="4" name="Date Placeholder 3"/>
+          <p:cNvSpPr>
+            <a:spLocks noGrp="1"/>
+          </p:cNvSpPr>
+          <p:nvPr>
+            <p:ph type="dt" sz="half" idx="10"/>
           </p:nvPr>
         </p:nvSpPr>
         <p:spPr/>
@@ -7069,40 +8246,21 @@
           <a:lstStyle/>
           <a:p>
             <a:r>
-              <a:rPr lang="en-US" dirty="0" smtClean="0"/>
-              <a:t>Implementation experience in HPX</a:t>
-            </a:r>
-          </a:p>
-          <a:p>
-            <a:r>
-              <a:rPr lang="en-US" dirty="0" smtClean="0"/>
-              <a:t>Use experience for 2 years in large scientific applications</a:t>
-            </a:r>
-          </a:p>
-          <a:p>
-            <a:r>
-              <a:rPr lang="en-US" dirty="0" smtClean="0"/>
-              <a:t>Has shown to help improving parallel efficiency of applications by factor of 2</a:t>
-            </a:r>
-          </a:p>
-          <a:p>
-            <a:pPr lvl="1"/>
-            <a:r>
-              <a:rPr lang="en-US" dirty="0" smtClean="0"/>
-              <a:t>Figure shows the utilization of cores in a time-step based stencil code, comparing synchronous and asynchronous operation</a:t>
-            </a:r>
-            <a:endParaRPr lang="en-US" dirty="0"/>
-          </a:p>
-        </p:txBody>
-      </p:sp>
-      <p:sp>
-        <p:nvSpPr>
-          <p:cNvPr id="9" name="Content Placeholder 8"/>
-          <p:cNvSpPr>
-            <a:spLocks noGrp="1"/>
-          </p:cNvSpPr>
-          <p:nvPr>
-            <p:ph sz="half" idx="2"/>
+              <a:rPr lang="en-US" smtClean="0"/>
+              <a:t>10/18/2016</a:t>
+            </a:r>
+            <a:endParaRPr lang="en-US"/>
+          </a:p>
+        </p:txBody>
+      </p:sp>
+      <p:sp>
+        <p:nvSpPr>
+          <p:cNvPr id="5" name="Footer Placeholder 4"/>
+          <p:cNvSpPr>
+            <a:spLocks noGrp="1"/>
+          </p:cNvSpPr>
+          <p:nvPr>
+            <p:ph type="ftr" sz="quarter" idx="11"/>
           </p:nvPr>
         </p:nvSpPr>
         <p:spPr/>
@@ -7110,53 +8268,11 @@
           <a:bodyPr/>
           <a:lstStyle/>
           <a:p>
-            <a:endParaRPr lang="en-US"/>
-          </a:p>
-        </p:txBody>
-      </p:sp>
-      <p:sp>
-        <p:nvSpPr>
-          <p:cNvPr id="4" name="Date Placeholder 3"/>
-          <p:cNvSpPr>
-            <a:spLocks noGrp="1"/>
-          </p:cNvSpPr>
-          <p:nvPr>
-            <p:ph type="dt" sz="half" idx="10"/>
-          </p:nvPr>
-        </p:nvSpPr>
-        <p:spPr/>
-        <p:txBody>
-          <a:bodyPr/>
-          <a:lstStyle/>
-          <a:p>
-            <a:r>
-              <a:rPr lang="en-US" smtClean="0"/>
-              <a:t>11/7/2016</a:t>
-            </a:r>
-            <a:endParaRPr lang="en-US"/>
-          </a:p>
-        </p:txBody>
-      </p:sp>
-      <p:sp>
-        <p:nvSpPr>
-          <p:cNvPr id="5" name="Footer Placeholder 4"/>
-          <p:cNvSpPr>
-            <a:spLocks noGrp="1"/>
-          </p:cNvSpPr>
-          <p:nvPr>
-            <p:ph type="ftr" sz="quarter" idx="11"/>
-          </p:nvPr>
-        </p:nvSpPr>
-        <p:spPr/>
-        <p:txBody>
-          <a:bodyPr/>
-          <a:lstStyle/>
-          <a:p>
-            <a:r>
-              <a:rPr lang="en-US" smtClean="0"/>
-              <a:t>P0361R2: Invoking Algorithms Asynchronously</a:t>
-            </a:r>
-            <a:endParaRPr lang="en-US"/>
+            <a:r>
+              <a:rPr lang="en-US" smtClean="0"/>
+              <a:t>HPX Workshop (Berkeley C++ Summit) - 3,            Hartmut Kaiser (hkaiser@cct.lsu.edu)</a:t>
+            </a:r>
+            <a:endParaRPr lang="en-US" dirty="0"/>
           </a:p>
         </p:txBody>
       </p:sp>
@@ -7177,9 +8293,515 @@
           </a:bodyPr>
           <a:lstStyle/>
           <a:p>
+            <a:fld id="{D59BBAD0-7158-41E2-BB8D-15D14837C8C5}" type="slidenum">
+              <a:rPr lang="en-US" smtClean="0"/>
+              <a:t>5</a:t>
+            </a:fld>
+            <a:endParaRPr lang="en-US"/>
+          </a:p>
+        </p:txBody>
+      </p:sp>
+    </p:spTree>
+    <p:extLst>
+      <p:ext uri="{BB962C8B-B14F-4D97-AF65-F5344CB8AC3E}">
+        <p14:creationId xmlns:p14="http://schemas.microsoft.com/office/powerpoint/2010/main" val="2967804017"/>
+      </p:ext>
+    </p:extLst>
+  </p:cSld>
+  <p:clrMapOvr>
+    <a:masterClrMapping/>
+  </p:clrMapOvr>
+  <p:timing>
+    <p:tnLst>
+      <p:par>
+        <p:cTn id="1" dur="indefinite" restart="never" nodeType="tmRoot">
+          <p:childTnLst>
+            <p:seq concurrent="1" nextAc="seek">
+              <p:cTn id="2" dur="indefinite" nodeType="mainSeq">
+                <p:childTnLst>
+                  <p:par>
+                    <p:cTn id="3" fill="hold">
+                      <p:stCondLst>
+                        <p:cond delay="indefinite"/>
+                      </p:stCondLst>
+                      <p:childTnLst>
+                        <p:par>
+                          <p:cTn id="4" fill="hold">
+                            <p:stCondLst>
+                              <p:cond delay="0"/>
+                            </p:stCondLst>
+                            <p:childTnLst>
+                              <p:par>
+                                <p:cTn id="5" presetID="2" presetClass="entr" presetSubtype="8" fill="hold" nodeType="clickEffect">
+                                  <p:stCondLst>
+                                    <p:cond delay="0"/>
+                                  </p:stCondLst>
+                                  <p:childTnLst>
+                                    <p:set>
+                                      <p:cBhvr>
+                                        <p:cTn id="6" dur="1" fill="hold">
+                                          <p:stCondLst>
+                                            <p:cond delay="0"/>
+                                          </p:stCondLst>
+                                        </p:cTn>
+                                        <p:tgtEl>
+                                          <p:spTgt spid="3">
+                                            <p:txEl>
+                                              <p:pRg st="5" end="5"/>
+                                            </p:txEl>
+                                          </p:spTgt>
+                                        </p:tgtEl>
+                                        <p:attrNameLst>
+                                          <p:attrName>style.visibility</p:attrName>
+                                        </p:attrNameLst>
+                                      </p:cBhvr>
+                                      <p:to>
+                                        <p:strVal val="visible"/>
+                                      </p:to>
+                                    </p:set>
+                                    <p:anim calcmode="lin" valueType="num">
+                                      <p:cBhvr additive="base">
+                                        <p:cTn id="7" dur="500" fill="hold"/>
+                                        <p:tgtEl>
+                                          <p:spTgt spid="3">
+                                            <p:txEl>
+                                              <p:pRg st="5" end="5"/>
+                                            </p:txEl>
+                                          </p:spTgt>
+                                        </p:tgtEl>
+                                        <p:attrNameLst>
+                                          <p:attrName>ppt_x</p:attrName>
+                                        </p:attrNameLst>
+                                      </p:cBhvr>
+                                      <p:tavLst>
+                                        <p:tav tm="0">
+                                          <p:val>
+                                            <p:strVal val="0-#ppt_w/2"/>
+                                          </p:val>
+                                        </p:tav>
+                                        <p:tav tm="100000">
+                                          <p:val>
+                                            <p:strVal val="#ppt_x"/>
+                                          </p:val>
+                                        </p:tav>
+                                      </p:tavLst>
+                                    </p:anim>
+                                    <p:anim calcmode="lin" valueType="num">
+                                      <p:cBhvr additive="base">
+                                        <p:cTn id="8" dur="500" fill="hold"/>
+                                        <p:tgtEl>
+                                          <p:spTgt spid="3">
+                                            <p:txEl>
+                                              <p:pRg st="5" end="5"/>
+                                            </p:txEl>
+                                          </p:spTgt>
+                                        </p:tgtEl>
+                                        <p:attrNameLst>
+                                          <p:attrName>ppt_y</p:attrName>
+                                        </p:attrNameLst>
+                                      </p:cBhvr>
+                                      <p:tavLst>
+                                        <p:tav tm="0">
+                                          <p:val>
+                                            <p:strVal val="#ppt_y"/>
+                                          </p:val>
+                                        </p:tav>
+                                        <p:tav tm="100000">
+                                          <p:val>
+                                            <p:strVal val="#ppt_y"/>
+                                          </p:val>
+                                        </p:tav>
+                                      </p:tavLst>
+                                    </p:anim>
+                                  </p:childTnLst>
+                                </p:cTn>
+                              </p:par>
+                              <p:par>
+                                <p:cTn id="9" presetID="2" presetClass="entr" presetSubtype="8" fill="hold" nodeType="withEffect">
+                                  <p:stCondLst>
+                                    <p:cond delay="0"/>
+                                  </p:stCondLst>
+                                  <p:childTnLst>
+                                    <p:set>
+                                      <p:cBhvr>
+                                        <p:cTn id="10" dur="1" fill="hold">
+                                          <p:stCondLst>
+                                            <p:cond delay="0"/>
+                                          </p:stCondLst>
+                                        </p:cTn>
+                                        <p:tgtEl>
+                                          <p:spTgt spid="3">
+                                            <p:txEl>
+                                              <p:pRg st="6" end="6"/>
+                                            </p:txEl>
+                                          </p:spTgt>
+                                        </p:tgtEl>
+                                        <p:attrNameLst>
+                                          <p:attrName>style.visibility</p:attrName>
+                                        </p:attrNameLst>
+                                      </p:cBhvr>
+                                      <p:to>
+                                        <p:strVal val="visible"/>
+                                      </p:to>
+                                    </p:set>
+                                    <p:anim calcmode="lin" valueType="num">
+                                      <p:cBhvr additive="base">
+                                        <p:cTn id="11" dur="500" fill="hold"/>
+                                        <p:tgtEl>
+                                          <p:spTgt spid="3">
+                                            <p:txEl>
+                                              <p:pRg st="6" end="6"/>
+                                            </p:txEl>
+                                          </p:spTgt>
+                                        </p:tgtEl>
+                                        <p:attrNameLst>
+                                          <p:attrName>ppt_x</p:attrName>
+                                        </p:attrNameLst>
+                                      </p:cBhvr>
+                                      <p:tavLst>
+                                        <p:tav tm="0">
+                                          <p:val>
+                                            <p:strVal val="0-#ppt_w/2"/>
+                                          </p:val>
+                                        </p:tav>
+                                        <p:tav tm="100000">
+                                          <p:val>
+                                            <p:strVal val="#ppt_x"/>
+                                          </p:val>
+                                        </p:tav>
+                                      </p:tavLst>
+                                    </p:anim>
+                                    <p:anim calcmode="lin" valueType="num">
+                                      <p:cBhvr additive="base">
+                                        <p:cTn id="12" dur="500" fill="hold"/>
+                                        <p:tgtEl>
+                                          <p:spTgt spid="3">
+                                            <p:txEl>
+                                              <p:pRg st="6" end="6"/>
+                                            </p:txEl>
+                                          </p:spTgt>
+                                        </p:tgtEl>
+                                        <p:attrNameLst>
+                                          <p:attrName>ppt_y</p:attrName>
+                                        </p:attrNameLst>
+                                      </p:cBhvr>
+                                      <p:tavLst>
+                                        <p:tav tm="0">
+                                          <p:val>
+                                            <p:strVal val="#ppt_y"/>
+                                          </p:val>
+                                        </p:tav>
+                                        <p:tav tm="100000">
+                                          <p:val>
+                                            <p:strVal val="#ppt_y"/>
+                                          </p:val>
+                                        </p:tav>
+                                      </p:tavLst>
+                                    </p:anim>
+                                  </p:childTnLst>
+                                </p:cTn>
+                              </p:par>
+                            </p:childTnLst>
+                          </p:cTn>
+                        </p:par>
+                      </p:childTnLst>
+                    </p:cTn>
+                  </p:par>
+                  <p:par>
+                    <p:cTn id="13" fill="hold">
+                      <p:stCondLst>
+                        <p:cond delay="indefinite"/>
+                      </p:stCondLst>
+                      <p:childTnLst>
+                        <p:par>
+                          <p:cTn id="14" fill="hold">
+                            <p:stCondLst>
+                              <p:cond delay="0"/>
+                            </p:stCondLst>
+                            <p:childTnLst>
+                              <p:par>
+                                <p:cTn id="15" presetID="2" presetClass="entr" presetSubtype="8" fill="hold" nodeType="clickEffect">
+                                  <p:stCondLst>
+                                    <p:cond delay="0"/>
+                                  </p:stCondLst>
+                                  <p:childTnLst>
+                                    <p:set>
+                                      <p:cBhvr>
+                                        <p:cTn id="16" dur="1" fill="hold">
+                                          <p:stCondLst>
+                                            <p:cond delay="0"/>
+                                          </p:stCondLst>
+                                        </p:cTn>
+                                        <p:tgtEl>
+                                          <p:spTgt spid="3">
+                                            <p:txEl>
+                                              <p:pRg st="7" end="7"/>
+                                            </p:txEl>
+                                          </p:spTgt>
+                                        </p:tgtEl>
+                                        <p:attrNameLst>
+                                          <p:attrName>style.visibility</p:attrName>
+                                        </p:attrNameLst>
+                                      </p:cBhvr>
+                                      <p:to>
+                                        <p:strVal val="visible"/>
+                                      </p:to>
+                                    </p:set>
+                                    <p:anim calcmode="lin" valueType="num">
+                                      <p:cBhvr additive="base">
+                                        <p:cTn id="17" dur="500" fill="hold"/>
+                                        <p:tgtEl>
+                                          <p:spTgt spid="3">
+                                            <p:txEl>
+                                              <p:pRg st="7" end="7"/>
+                                            </p:txEl>
+                                          </p:spTgt>
+                                        </p:tgtEl>
+                                        <p:attrNameLst>
+                                          <p:attrName>ppt_x</p:attrName>
+                                        </p:attrNameLst>
+                                      </p:cBhvr>
+                                      <p:tavLst>
+                                        <p:tav tm="0">
+                                          <p:val>
+                                            <p:strVal val="0-#ppt_w/2"/>
+                                          </p:val>
+                                        </p:tav>
+                                        <p:tav tm="100000">
+                                          <p:val>
+                                            <p:strVal val="#ppt_x"/>
+                                          </p:val>
+                                        </p:tav>
+                                      </p:tavLst>
+                                    </p:anim>
+                                    <p:anim calcmode="lin" valueType="num">
+                                      <p:cBhvr additive="base">
+                                        <p:cTn id="18" dur="500" fill="hold"/>
+                                        <p:tgtEl>
+                                          <p:spTgt spid="3">
+                                            <p:txEl>
+                                              <p:pRg st="7" end="7"/>
+                                            </p:txEl>
+                                          </p:spTgt>
+                                        </p:tgtEl>
+                                        <p:attrNameLst>
+                                          <p:attrName>ppt_y</p:attrName>
+                                        </p:attrNameLst>
+                                      </p:cBhvr>
+                                      <p:tavLst>
+                                        <p:tav tm="0">
+                                          <p:val>
+                                            <p:strVal val="#ppt_y"/>
+                                          </p:val>
+                                        </p:tav>
+                                        <p:tav tm="100000">
+                                          <p:val>
+                                            <p:strVal val="#ppt_y"/>
+                                          </p:val>
+                                        </p:tav>
+                                      </p:tavLst>
+                                    </p:anim>
+                                  </p:childTnLst>
+                                </p:cTn>
+                              </p:par>
+                            </p:childTnLst>
+                          </p:cTn>
+                        </p:par>
+                      </p:childTnLst>
+                    </p:cTn>
+                  </p:par>
+                </p:childTnLst>
+              </p:cTn>
+              <p:prevCondLst>
+                <p:cond evt="onPrev" delay="0">
+                  <p:tgtEl>
+                    <p:sldTgt/>
+                  </p:tgtEl>
+                </p:cond>
+              </p:prevCondLst>
+              <p:nextCondLst>
+                <p:cond evt="onNext" delay="0">
+                  <p:tgtEl>
+                    <p:sldTgt/>
+                  </p:tgtEl>
+                </p:cond>
+              </p:nextCondLst>
+            </p:seq>
+          </p:childTnLst>
+        </p:cTn>
+      </p:par>
+    </p:tnLst>
+  </p:timing>
+</p:sld>
+</file>
+
+<file path=ppt/slides/slide6.xml><?xml version="1.0" encoding="utf-8"?>
+<p:sld xmlns:a="http://schemas.openxmlformats.org/drawingml/2006/main" xmlns:r="http://schemas.openxmlformats.org/officeDocument/2006/relationships" xmlns:p="http://schemas.openxmlformats.org/presentationml/2006/main">
+  <p:cSld>
+    <p:spTree>
+      <p:nvGrpSpPr>
+        <p:cNvPr id="1" name=""/>
+        <p:cNvGrpSpPr/>
+        <p:nvPr/>
+      </p:nvGrpSpPr>
+      <p:grpSpPr>
+        <a:xfrm>
+          <a:off x="0" y="0"/>
+          <a:ext cx="0" cy="0"/>
+          <a:chOff x="0" y="0"/>
+          <a:chExt cx="0" cy="0"/>
+        </a:xfrm>
+      </p:grpSpPr>
+      <p:sp>
+        <p:nvSpPr>
+          <p:cNvPr id="2" name="Title 1"/>
+          <p:cNvSpPr>
+            <a:spLocks noGrp="1"/>
+          </p:cNvSpPr>
+          <p:nvPr>
+            <p:ph type="title"/>
+          </p:nvPr>
+        </p:nvSpPr>
+        <p:spPr/>
+        <p:txBody>
+          <a:bodyPr/>
+          <a:lstStyle/>
+          <a:p>
+            <a:r>
+              <a:rPr lang="en-US" dirty="0" smtClean="0"/>
+              <a:t>Implementation</a:t>
+            </a:r>
+            <a:endParaRPr lang="en-US" dirty="0"/>
+          </a:p>
+        </p:txBody>
+      </p:sp>
+      <p:sp>
+        <p:nvSpPr>
+          <p:cNvPr id="3" name="Content Placeholder 2"/>
+          <p:cNvSpPr>
+            <a:spLocks noGrp="1"/>
+          </p:cNvSpPr>
+          <p:nvPr>
+            <p:ph sz="half" idx="1"/>
+          </p:nvPr>
+        </p:nvSpPr>
+        <p:spPr/>
+        <p:txBody>
+          <a:bodyPr/>
+          <a:lstStyle/>
+          <a:p>
+            <a:r>
+              <a:rPr lang="en-US" dirty="0" smtClean="0"/>
+              <a:t>Implementation experience in HPX</a:t>
+            </a:r>
+          </a:p>
+          <a:p>
+            <a:r>
+              <a:rPr lang="en-US" dirty="0" smtClean="0"/>
+              <a:t>Use experience for 2 years in large scientific applications</a:t>
+            </a:r>
+          </a:p>
+          <a:p>
+            <a:r>
+              <a:rPr lang="en-US" dirty="0" smtClean="0"/>
+              <a:t>Has shown to help improving parallel efficiency of applications by factor of 2</a:t>
+            </a:r>
+          </a:p>
+          <a:p>
+            <a:pPr lvl="1"/>
+            <a:r>
+              <a:rPr lang="en-US" dirty="0" smtClean="0"/>
+              <a:t>Figure shows the utilization of cores in a time-step based stencil code, comparing synchronous and asynchronous operation</a:t>
+            </a:r>
+            <a:endParaRPr lang="en-US" dirty="0"/>
+          </a:p>
+        </p:txBody>
+      </p:sp>
+      <p:sp>
+        <p:nvSpPr>
+          <p:cNvPr id="9" name="Content Placeholder 8"/>
+          <p:cNvSpPr>
+            <a:spLocks noGrp="1"/>
+          </p:cNvSpPr>
+          <p:nvPr>
+            <p:ph sz="half" idx="2"/>
+          </p:nvPr>
+        </p:nvSpPr>
+        <p:spPr/>
+        <p:txBody>
+          <a:bodyPr/>
+          <a:lstStyle/>
+          <a:p>
+            <a:endParaRPr lang="en-US"/>
+          </a:p>
+        </p:txBody>
+      </p:sp>
+      <p:sp>
+        <p:nvSpPr>
+          <p:cNvPr id="4" name="Date Placeholder 3"/>
+          <p:cNvSpPr>
+            <a:spLocks noGrp="1"/>
+          </p:cNvSpPr>
+          <p:nvPr>
+            <p:ph type="dt" sz="half" idx="10"/>
+          </p:nvPr>
+        </p:nvSpPr>
+        <p:spPr/>
+        <p:txBody>
+          <a:bodyPr/>
+          <a:lstStyle/>
+          <a:p>
+            <a:r>
+              <a:rPr lang="en-US" smtClean="0"/>
+              <a:t>11/7/2016</a:t>
+            </a:r>
+            <a:endParaRPr lang="en-US"/>
+          </a:p>
+        </p:txBody>
+      </p:sp>
+      <p:sp>
+        <p:nvSpPr>
+          <p:cNvPr id="5" name="Footer Placeholder 4"/>
+          <p:cNvSpPr>
+            <a:spLocks noGrp="1"/>
+          </p:cNvSpPr>
+          <p:nvPr>
+            <p:ph type="ftr" sz="quarter" idx="11"/>
+          </p:nvPr>
+        </p:nvSpPr>
+        <p:spPr/>
+        <p:txBody>
+          <a:bodyPr/>
+          <a:lstStyle/>
+          <a:p>
+            <a:r>
+              <a:rPr lang="en-US" smtClean="0"/>
+              <a:t>P0361R2: Invoking Algorithms Asynchronously</a:t>
+            </a:r>
+            <a:endParaRPr lang="en-US"/>
+          </a:p>
+        </p:txBody>
+      </p:sp>
+      <p:sp>
+        <p:nvSpPr>
+          <p:cNvPr id="6" name="Slide Number Placeholder 5"/>
+          <p:cNvSpPr>
+            <a:spLocks noGrp="1"/>
+          </p:cNvSpPr>
+          <p:nvPr>
+            <p:ph type="sldNum" sz="quarter" idx="12"/>
+          </p:nvPr>
+        </p:nvSpPr>
+        <p:spPr/>
+        <p:txBody>
+          <a:bodyPr>
+            <a:normAutofit lnSpcReduction="10000"/>
+          </a:bodyPr>
+          <a:lstStyle/>
+          <a:p>
             <a:fld id="{7848FB04-1C7C-414F-BE18-01CEEBD08DC5}" type="slidenum">
               <a:rPr lang="en-US" smtClean="0"/>
-              <a:t>5</a:t>
+              <a:t>6</a:t>
             </a:fld>
             <a:endParaRPr lang="en-US"/>
           </a:p>
@@ -7354,204 +8976,6 @@
 </p:sld>
 </file>
 
-<file path=ppt/slides/slide6.xml><?xml version="1.0" encoding="utf-8"?>
-<p:sld xmlns:a="http://schemas.openxmlformats.org/drawingml/2006/main" xmlns:r="http://schemas.openxmlformats.org/officeDocument/2006/relationships" xmlns:p="http://schemas.openxmlformats.org/presentationml/2006/main">
-  <p:cSld>
-    <p:spTree>
-      <p:nvGrpSpPr>
-        <p:cNvPr id="1" name=""/>
-        <p:cNvGrpSpPr/>
-        <p:nvPr/>
-      </p:nvGrpSpPr>
-      <p:grpSpPr>
-        <a:xfrm>
-          <a:off x="0" y="0"/>
-          <a:ext cx="0" cy="0"/>
-          <a:chOff x="0" y="0"/>
-          <a:chExt cx="0" cy="0"/>
-        </a:xfrm>
-      </p:grpSpPr>
-      <p:sp>
-        <p:nvSpPr>
-          <p:cNvPr id="2" name="Title 1"/>
-          <p:cNvSpPr>
-            <a:spLocks noGrp="1"/>
-          </p:cNvSpPr>
-          <p:nvPr>
-            <p:ph type="title"/>
-          </p:nvPr>
-        </p:nvSpPr>
-        <p:spPr/>
-        <p:txBody>
-          <a:bodyPr/>
-          <a:lstStyle/>
-          <a:p>
-            <a:r>
-              <a:rPr lang="en-US" dirty="0" smtClean="0"/>
-              <a:t>Discussion</a:t>
-            </a:r>
-            <a:endParaRPr lang="en-US" dirty="0"/>
-          </a:p>
-        </p:txBody>
-      </p:sp>
-      <p:sp>
-        <p:nvSpPr>
-          <p:cNvPr id="3" name="Content Placeholder 2"/>
-          <p:cNvSpPr>
-            <a:spLocks noGrp="1"/>
-          </p:cNvSpPr>
-          <p:nvPr>
-            <p:ph idx="1"/>
-          </p:nvPr>
-        </p:nvSpPr>
-        <p:spPr/>
-        <p:txBody>
-          <a:bodyPr/>
-          <a:lstStyle/>
-          <a:p>
-            <a:r>
-              <a:rPr lang="en-US" dirty="0"/>
-              <a:t>Use separate overloads for asynchronous algorithms instead of new execution </a:t>
-            </a:r>
-            <a:r>
-              <a:rPr lang="en-US" dirty="0" smtClean="0"/>
-              <a:t>policies</a:t>
-            </a:r>
-          </a:p>
-          <a:p>
-            <a:r>
-              <a:rPr lang="en-US" dirty="0" smtClean="0"/>
-              <a:t>Rationale:</a:t>
-            </a:r>
-          </a:p>
-          <a:p>
-            <a:pPr lvl="1"/>
-            <a:r>
-              <a:rPr lang="en-US" dirty="0" smtClean="0"/>
-              <a:t>Asynchronous algorithms may need different set of algorithms</a:t>
-            </a:r>
-          </a:p>
-          <a:p>
-            <a:pPr lvl="1"/>
-            <a:endParaRPr lang="en-US" dirty="0" smtClean="0"/>
-          </a:p>
-          <a:p>
-            <a:r>
-              <a:rPr lang="en-US" dirty="0" smtClean="0"/>
-              <a:t>This is certainly a possible solution</a:t>
-            </a:r>
-          </a:p>
-          <a:p>
-            <a:pPr lvl="1"/>
-            <a:r>
-              <a:rPr lang="en-US" dirty="0" smtClean="0"/>
-              <a:t>Prevents generic programming</a:t>
-            </a:r>
-          </a:p>
-          <a:p>
-            <a:pPr lvl="1"/>
-            <a:r>
-              <a:rPr lang="en-US" dirty="0" smtClean="0"/>
-              <a:t>In our implementation we have seen no need for different set of arguments</a:t>
-            </a:r>
-          </a:p>
-          <a:p>
-            <a:pPr lvl="1"/>
-            <a:endParaRPr lang="en-US" dirty="0"/>
-          </a:p>
-        </p:txBody>
-      </p:sp>
-      <p:sp>
-        <p:nvSpPr>
-          <p:cNvPr id="4" name="Date Placeholder 3"/>
-          <p:cNvSpPr>
-            <a:spLocks noGrp="1"/>
-          </p:cNvSpPr>
-          <p:nvPr>
-            <p:ph type="dt" sz="half" idx="10"/>
-          </p:nvPr>
-        </p:nvSpPr>
-        <p:spPr/>
-        <p:txBody>
-          <a:bodyPr/>
-          <a:lstStyle/>
-          <a:p>
-            <a:r>
-              <a:rPr lang="en-US" smtClean="0"/>
-              <a:t>11/7/2016</a:t>
-            </a:r>
-            <a:endParaRPr lang="en-US"/>
-          </a:p>
-        </p:txBody>
-      </p:sp>
-      <p:sp>
-        <p:nvSpPr>
-          <p:cNvPr id="5" name="Footer Placeholder 4"/>
-          <p:cNvSpPr>
-            <a:spLocks noGrp="1"/>
-          </p:cNvSpPr>
-          <p:nvPr>
-            <p:ph type="ftr" sz="quarter" idx="11"/>
-          </p:nvPr>
-        </p:nvSpPr>
-        <p:spPr/>
-        <p:txBody>
-          <a:bodyPr/>
-          <a:lstStyle/>
-          <a:p>
-            <a:r>
-              <a:rPr lang="en-US" smtClean="0"/>
-              <a:t>P0361R2: Invoking Algorithms Asynchronously</a:t>
-            </a:r>
-            <a:endParaRPr lang="en-US"/>
-          </a:p>
-        </p:txBody>
-      </p:sp>
-      <p:sp>
-        <p:nvSpPr>
-          <p:cNvPr id="6" name="Slide Number Placeholder 5"/>
-          <p:cNvSpPr>
-            <a:spLocks noGrp="1"/>
-          </p:cNvSpPr>
-          <p:nvPr>
-            <p:ph type="sldNum" sz="quarter" idx="12"/>
-          </p:nvPr>
-        </p:nvSpPr>
-        <p:spPr/>
-        <p:txBody>
-          <a:bodyPr>
-            <a:normAutofit lnSpcReduction="10000"/>
-          </a:bodyPr>
-          <a:lstStyle/>
-          <a:p>
-            <a:fld id="{7848FB04-1C7C-414F-BE18-01CEEBD08DC5}" type="slidenum">
-              <a:rPr lang="en-US" smtClean="0"/>
-              <a:t>6</a:t>
-            </a:fld>
-            <a:endParaRPr lang="en-US"/>
-          </a:p>
-        </p:txBody>
-      </p:sp>
-    </p:spTree>
-    <p:extLst>
-      <p:ext uri="{BB962C8B-B14F-4D97-AF65-F5344CB8AC3E}">
-        <p14:creationId xmlns:p14="http://schemas.microsoft.com/office/powerpoint/2010/main" val="1058239195"/>
-      </p:ext>
-    </p:extLst>
-  </p:cSld>
-  <p:clrMapOvr>
-    <a:masterClrMapping/>
-  </p:clrMapOvr>
-  <p:timing>
-    <p:tnLst>
-      <p:par>
-        <p:cTn id="1" dur="indefinite" restart="never" nodeType="tmRoot"/>
-      </p:par>
-    </p:tnLst>
-  </p:timing>
-</p:sld>
-</file>
-
 <file path=ppt/slides/slide7.xml><?xml version="1.0" encoding="utf-8"?>
 <p:sld xmlns:a="http://schemas.openxmlformats.org/drawingml/2006/main" xmlns:r="http://schemas.openxmlformats.org/officeDocument/2006/relationships" xmlns:p="http://schemas.openxmlformats.org/presentationml/2006/main">
   <p:cSld>
@@ -7604,111 +9028,57 @@
         </p:nvSpPr>
         <p:spPr/>
         <p:txBody>
-          <a:bodyPr>
-            <a:normAutofit fontScale="92500" lnSpcReduction="10000"/>
-          </a:bodyPr>
+          <a:bodyPr/>
           <a:lstStyle/>
           <a:p>
             <a:r>
+              <a:rPr lang="en-US" dirty="0"/>
+              <a:t>Use separate overloads for asynchronous algorithms instead of new execution </a:t>
+            </a:r>
+            <a:r>
               <a:rPr lang="en-US" dirty="0" smtClean="0"/>
-              <a:t>Do </a:t>
-            </a:r>
-            <a:r>
-              <a:rPr lang="en-US" dirty="0"/>
-              <a:t>not introduce asynchronous algorithms now as those may be subsumed by core language functionalities (such as  </a:t>
-            </a:r>
-            <a:r>
-              <a:rPr lang="en-US" dirty="0" err="1"/>
-              <a:t>suspendable</a:t>
-            </a:r>
-            <a:r>
-              <a:rPr lang="en-US" dirty="0"/>
-              <a:t>  functions, see [P0071R2</a:t>
-            </a:r>
+              <a:t>policies</a:t>
+            </a:r>
+          </a:p>
+          <a:p>
             <a:r>
               <a:rPr lang="en-US" dirty="0" smtClean="0"/>
-              <a:t>]) </a:t>
-            </a:r>
-            <a:r>
-              <a:rPr lang="en-US" dirty="0"/>
-              <a:t>which are currently proposed and under discussion</a:t>
-            </a:r>
+              <a:t>Rationale:</a:t>
+            </a:r>
+          </a:p>
+          <a:p>
+            <a:pPr lvl="1"/>
             <a:r>
               <a:rPr lang="en-US" dirty="0" smtClean="0"/>
-              <a:t>.</a:t>
+              <a:t>Asynchronous algorithms may need different set of algorithms</a:t>
             </a:r>
           </a:p>
           <a:p>
             <a:pPr lvl="1"/>
-            <a:r>
-              <a:rPr lang="en-US" dirty="0"/>
-              <a:t>Asynchronous algorithms are a feature requested by several people in SG1 and SG14. </a:t>
-            </a:r>
             <a:endParaRPr lang="en-US" dirty="0" smtClean="0"/>
           </a:p>
           <a:p>
+            <a:r>
+              <a:rPr lang="en-US" dirty="0" smtClean="0"/>
+              <a:t>This is certainly a possible solution</a:t>
+            </a:r>
+          </a:p>
+          <a:p>
             <a:pPr lvl="1"/>
             <a:r>
               <a:rPr lang="en-US" dirty="0" smtClean="0"/>
-              <a:t>Solid </a:t>
-            </a:r>
-            <a:r>
-              <a:rPr lang="en-US" dirty="0"/>
-              <a:t>implementation </a:t>
-            </a:r>
+              <a:t>Prevents generic programming</a:t>
+            </a:r>
+          </a:p>
+          <a:p>
+            <a:pPr lvl="1"/>
             <a:r>
               <a:rPr lang="en-US" dirty="0" smtClean="0"/>
-              <a:t>and usage experience</a:t>
-            </a:r>
-          </a:p>
-          <a:p>
-            <a:r>
-              <a:rPr lang="en-US" dirty="0"/>
-              <a:t>The </a:t>
-            </a:r>
-            <a:r>
-              <a:rPr lang="en-US" dirty="0" err="1"/>
-              <a:t>suspendable</a:t>
-            </a:r>
-            <a:r>
-              <a:rPr lang="en-US" dirty="0"/>
-              <a:t> functions proposal without any doubt has merit and may partially or fully subsume the features </a:t>
-            </a:r>
-            <a:r>
-              <a:rPr lang="en-US" dirty="0" smtClean="0"/>
-              <a:t>proposed</a:t>
+              <a:t>In our implementation we have seen no need for different set of arguments</a:t>
             </a:r>
           </a:p>
           <a:p>
             <a:pPr lvl="1"/>
-            <a:r>
-              <a:rPr lang="en-US" dirty="0" smtClean="0"/>
-              <a:t>Requires compiler support</a:t>
-            </a:r>
-          </a:p>
-          <a:p>
-            <a:pPr lvl="1"/>
-            <a:r>
-              <a:rPr lang="en-US" dirty="0" smtClean="0"/>
-              <a:t>Unclear if and when available</a:t>
-            </a:r>
-          </a:p>
-          <a:p>
-            <a:pPr lvl="1"/>
-            <a:r>
-              <a:rPr lang="en-US" dirty="0" smtClean="0"/>
-              <a:t>No implementation experience</a:t>
-            </a:r>
-          </a:p>
-          <a:p>
-            <a:r>
-              <a:rPr lang="en-US" dirty="0"/>
-              <a:t>We would rather move forward with an existing and proven solution now to give users more experience with possible </a:t>
-            </a:r>
-            <a:r>
-              <a:rPr lang="en-US" dirty="0" smtClean="0"/>
-              <a:t>implementations</a:t>
-            </a:r>
             <a:endParaRPr lang="en-US" dirty="0"/>
           </a:p>
         </p:txBody>
@@ -7787,7 +9157,7 @@
     </p:spTree>
     <p:extLst>
       <p:ext uri="{BB962C8B-B14F-4D97-AF65-F5344CB8AC3E}">
-        <p14:creationId xmlns:p14="http://schemas.microsoft.com/office/powerpoint/2010/main" val="2212491759"/>
+        <p14:creationId xmlns:p14="http://schemas.microsoft.com/office/powerpoint/2010/main" val="1058239195"/>
       </p:ext>
     </p:extLst>
   </p:cSld>
@@ -7821,228 +9191,14 @@
           <a:chExt cx="0" cy="0"/>
         </a:xfrm>
       </p:grpSpPr>
-      <p:pic>
-        <p:nvPicPr>
-          <p:cNvPr id="7" name="Picture 6"/>
-          <p:cNvPicPr>
-            <a:picLocks noChangeAspect="1"/>
-          </p:cNvPicPr>
-          <p:nvPr/>
-        </p:nvPicPr>
-        <p:blipFill>
-          <a:blip r:embed="rId3">
-            <a:extLst>
-              <a:ext uri="{28A0092B-C50C-407E-A947-70E740481C1C}">
-                <a14:useLocalDpi xmlns:a14="http://schemas.microsoft.com/office/drawing/2010/main" val="0"/>
-              </a:ext>
-            </a:extLst>
-          </a:blip>
-          <a:stretch>
-            <a:fillRect/>
-          </a:stretch>
-        </p:blipFill>
-        <p:spPr>
-          <a:xfrm>
-            <a:off x="834937" y="561634"/>
-            <a:ext cx="3810000" cy="2857500"/>
-          </a:xfrm>
-          <a:prstGeom prst="rect">
-            <a:avLst/>
-          </a:prstGeom>
-        </p:spPr>
-      </p:pic>
-      <p:pic>
-        <p:nvPicPr>
-          <p:cNvPr id="8" name="Picture 7"/>
-          <p:cNvPicPr>
-            <a:picLocks noChangeAspect="1"/>
-          </p:cNvPicPr>
-          <p:nvPr/>
-        </p:nvPicPr>
-        <p:blipFill>
-          <a:blip r:embed="rId4">
-            <a:extLst>
-              <a:ext uri="{28A0092B-C50C-407E-A947-70E740481C1C}">
-                <a14:useLocalDpi xmlns:a14="http://schemas.microsoft.com/office/drawing/2010/main" val="0"/>
-              </a:ext>
-            </a:extLst>
-          </a:blip>
-          <a:stretch>
-            <a:fillRect/>
-          </a:stretch>
-        </p:blipFill>
-        <p:spPr>
-          <a:xfrm>
-            <a:off x="7079735" y="3419134"/>
-            <a:ext cx="3813602" cy="2860201"/>
-          </a:xfrm>
-          <a:prstGeom prst="rect">
-            <a:avLst/>
-          </a:prstGeom>
-        </p:spPr>
-      </p:pic>
-      <p:pic>
-        <p:nvPicPr>
-          <p:cNvPr id="9" name="Picture 8"/>
-          <p:cNvPicPr>
-            <a:picLocks noChangeAspect="1"/>
-          </p:cNvPicPr>
-          <p:nvPr/>
-        </p:nvPicPr>
-        <p:blipFill>
-          <a:blip r:embed="rId5">
-            <a:extLst>
-              <a:ext uri="{28A0092B-C50C-407E-A947-70E740481C1C}">
-                <a14:useLocalDpi xmlns:a14="http://schemas.microsoft.com/office/drawing/2010/main" val="0"/>
-              </a:ext>
-            </a:extLst>
-          </a:blip>
-          <a:stretch>
-            <a:fillRect/>
-          </a:stretch>
-        </p:blipFill>
-        <p:spPr>
-          <a:xfrm>
-            <a:off x="3955536" y="2182075"/>
-            <a:ext cx="3813600" cy="2860200"/>
-          </a:xfrm>
-          <a:prstGeom prst="rect">
-            <a:avLst/>
-          </a:prstGeom>
-        </p:spPr>
-      </p:pic>
-      <p:pic>
-        <p:nvPicPr>
-          <p:cNvPr id="10" name="Picture 9"/>
-          <p:cNvPicPr>
-            <a:picLocks noChangeAspect="1"/>
-          </p:cNvPicPr>
-          <p:nvPr/>
-        </p:nvPicPr>
-        <p:blipFill>
-          <a:blip r:embed="rId6" cstate="print">
-            <a:extLst>
-              <a:ext uri="{28A0092B-C50C-407E-A947-70E740481C1C}">
-                <a14:useLocalDpi xmlns:a14="http://schemas.microsoft.com/office/drawing/2010/main" val="0"/>
-              </a:ext>
-            </a:extLst>
-          </a:blip>
-          <a:stretch>
-            <a:fillRect/>
-          </a:stretch>
-        </p:blipFill>
-        <p:spPr>
-          <a:xfrm>
-            <a:off x="831619" y="3805215"/>
-            <a:ext cx="2795905" cy="1866267"/>
-          </a:xfrm>
-          <a:prstGeom prst="rect">
-            <a:avLst/>
-          </a:prstGeom>
-        </p:spPr>
-      </p:pic>
-      <p:pic>
-        <p:nvPicPr>
-          <p:cNvPr id="11" name="Picture 10"/>
-          <p:cNvPicPr>
-            <a:picLocks noChangeAspect="1"/>
-          </p:cNvPicPr>
-          <p:nvPr/>
-        </p:nvPicPr>
-        <p:blipFill>
-          <a:blip r:embed="rId7" cstate="print">
-            <a:extLst>
-              <a:ext uri="{28A0092B-C50C-407E-A947-70E740481C1C}">
-                <a14:useLocalDpi xmlns:a14="http://schemas.microsoft.com/office/drawing/2010/main" val="0"/>
-              </a:ext>
-            </a:extLst>
-          </a:blip>
-          <a:stretch>
-            <a:fillRect/>
-          </a:stretch>
-        </p:blipFill>
-        <p:spPr>
-          <a:xfrm>
-            <a:off x="8097147" y="1181098"/>
-            <a:ext cx="2796189" cy="1839224"/>
-          </a:xfrm>
-          <a:prstGeom prst="rect">
-            <a:avLst/>
-          </a:prstGeom>
-        </p:spPr>
-      </p:pic>
-      <p:pic>
-        <p:nvPicPr>
-          <p:cNvPr id="13" name="Picture 12"/>
-          <p:cNvPicPr>
-            <a:picLocks noChangeAspect="1"/>
-          </p:cNvPicPr>
-          <p:nvPr/>
-        </p:nvPicPr>
-        <p:blipFill>
-          <a:blip r:embed="rId8" cstate="print">
-            <a:extLst>
-              <a:ext uri="{28A0092B-C50C-407E-A947-70E740481C1C}">
-                <a14:useLocalDpi xmlns:a14="http://schemas.microsoft.com/office/drawing/2010/main" val="0"/>
-              </a:ext>
-            </a:extLst>
-          </a:blip>
-          <a:stretch>
-            <a:fillRect/>
-          </a:stretch>
-        </p:blipFill>
-        <p:spPr>
-          <a:xfrm>
-            <a:off x="4891759" y="859264"/>
-            <a:ext cx="2958566" cy="643669"/>
-          </a:xfrm>
-          <a:prstGeom prst="rect">
-            <a:avLst/>
-          </a:prstGeom>
-          <a:noFill/>
-          <a:ln>
-            <a:noFill/>
-          </a:ln>
-        </p:spPr>
-      </p:pic>
-      <p:pic>
-        <p:nvPicPr>
-          <p:cNvPr id="16" name="Picture 15"/>
-          <p:cNvPicPr>
-            <a:picLocks noChangeAspect="1"/>
-          </p:cNvPicPr>
-          <p:nvPr/>
-        </p:nvPicPr>
-        <p:blipFill>
-          <a:blip r:embed="rId9" cstate="print">
-            <a:extLst>
-              <a:ext uri="{28A0092B-C50C-407E-A947-70E740481C1C}">
-                <a14:useLocalDpi xmlns:a14="http://schemas.microsoft.com/office/drawing/2010/main" val="0"/>
-              </a:ext>
-            </a:extLst>
-          </a:blip>
-          <a:stretch>
-            <a:fillRect/>
-          </a:stretch>
-        </p:blipFill>
-        <p:spPr>
-          <a:xfrm>
-            <a:off x="4068578" y="5452033"/>
-            <a:ext cx="2570102" cy="346964"/>
-          </a:xfrm>
-          <a:prstGeom prst="rect">
-            <a:avLst/>
-          </a:prstGeom>
-        </p:spPr>
-      </p:pic>
-      <p:sp>
-        <p:nvSpPr>
-          <p:cNvPr id="2" name="Date Placeholder 1"/>
-          <p:cNvSpPr>
-            <a:spLocks noGrp="1"/>
-          </p:cNvSpPr>
-          <p:nvPr>
-            <p:ph type="dt" sz="half" idx="10"/>
+      <p:sp>
+        <p:nvSpPr>
+          <p:cNvPr id="2" name="Title 1"/>
+          <p:cNvSpPr>
+            <a:spLocks noGrp="1"/>
+          </p:cNvSpPr>
+          <p:nvPr>
+            <p:ph type="title"/>
           </p:nvPr>
         </p:nvSpPr>
         <p:spPr/>
@@ -8051,21 +9207,142 @@
           <a:lstStyle/>
           <a:p>
             <a:r>
-              <a:rPr lang="en-US" smtClean="0"/>
-              <a:t>11/7/2016</a:t>
-            </a:r>
-            <a:endParaRPr lang="en-US"/>
-          </a:p>
-        </p:txBody>
-      </p:sp>
-      <p:sp>
-        <p:nvSpPr>
-          <p:cNvPr id="3" name="Footer Placeholder 2"/>
-          <p:cNvSpPr>
-            <a:spLocks noGrp="1"/>
-          </p:cNvSpPr>
-          <p:nvPr>
-            <p:ph type="ftr" sz="quarter" idx="11"/>
+              <a:rPr lang="en-US" dirty="0" smtClean="0"/>
+              <a:t>Discussion</a:t>
+            </a:r>
+            <a:endParaRPr lang="en-US" dirty="0"/>
+          </a:p>
+        </p:txBody>
+      </p:sp>
+      <p:sp>
+        <p:nvSpPr>
+          <p:cNvPr id="3" name="Content Placeholder 2"/>
+          <p:cNvSpPr>
+            <a:spLocks noGrp="1"/>
+          </p:cNvSpPr>
+          <p:nvPr>
+            <p:ph idx="1"/>
+          </p:nvPr>
+        </p:nvSpPr>
+        <p:spPr/>
+        <p:txBody>
+          <a:bodyPr>
+            <a:normAutofit fontScale="92500" lnSpcReduction="10000"/>
+          </a:bodyPr>
+          <a:lstStyle/>
+          <a:p>
+            <a:r>
+              <a:rPr lang="en-US" dirty="0" smtClean="0"/>
+              <a:t>Do </a:t>
+            </a:r>
+            <a:r>
+              <a:rPr lang="en-US" dirty="0"/>
+              <a:t>not introduce asynchronous algorithms now as those may be subsumed by core language functionalities (such as  </a:t>
+            </a:r>
+            <a:r>
+              <a:rPr lang="en-US" dirty="0" err="1"/>
+              <a:t>suspendable</a:t>
+            </a:r>
+            <a:r>
+              <a:rPr lang="en-US" dirty="0"/>
+              <a:t>  functions, see [P0071R2</a:t>
+            </a:r>
+            <a:r>
+              <a:rPr lang="en-US" dirty="0" smtClean="0"/>
+              <a:t>]) </a:t>
+            </a:r>
+            <a:r>
+              <a:rPr lang="en-US" dirty="0"/>
+              <a:t>which are currently proposed and under discussion</a:t>
+            </a:r>
+            <a:r>
+              <a:rPr lang="en-US" dirty="0" smtClean="0"/>
+              <a:t>.</a:t>
+            </a:r>
+          </a:p>
+          <a:p>
+            <a:pPr lvl="1"/>
+            <a:r>
+              <a:rPr lang="en-US" dirty="0"/>
+              <a:t>Asynchronous algorithms are a feature requested by several people in SG1 and SG14. </a:t>
+            </a:r>
+            <a:endParaRPr lang="en-US" dirty="0" smtClean="0"/>
+          </a:p>
+          <a:p>
+            <a:pPr lvl="1"/>
+            <a:r>
+              <a:rPr lang="en-US" dirty="0" smtClean="0"/>
+              <a:t>We have solid </a:t>
+            </a:r>
+            <a:r>
+              <a:rPr lang="en-US" dirty="0"/>
+              <a:t>implementation </a:t>
+            </a:r>
+            <a:r>
+              <a:rPr lang="en-US" dirty="0" smtClean="0"/>
+              <a:t>and usage experience</a:t>
+            </a:r>
+          </a:p>
+          <a:p>
+            <a:r>
+              <a:rPr lang="en-US" dirty="0"/>
+              <a:t>The </a:t>
+            </a:r>
+            <a:r>
+              <a:rPr lang="en-US" dirty="0" err="1"/>
+              <a:t>suspendable</a:t>
+            </a:r>
+            <a:r>
+              <a:rPr lang="en-US" dirty="0"/>
+              <a:t> functions proposal without any doubt has merit and may partially or fully subsume the features </a:t>
+            </a:r>
+            <a:r>
+              <a:rPr lang="en-US" dirty="0" smtClean="0"/>
+              <a:t>proposed</a:t>
+            </a:r>
+          </a:p>
+          <a:p>
+            <a:pPr lvl="1"/>
+            <a:r>
+              <a:rPr lang="en-US" dirty="0" smtClean="0"/>
+              <a:t>Requires compiler support</a:t>
+            </a:r>
+          </a:p>
+          <a:p>
+            <a:pPr lvl="1"/>
+            <a:r>
+              <a:rPr lang="en-US" dirty="0" smtClean="0"/>
+              <a:t>Unclear if and when available</a:t>
+            </a:r>
+          </a:p>
+          <a:p>
+            <a:pPr lvl="1"/>
+            <a:r>
+              <a:rPr lang="en-US" dirty="0" smtClean="0"/>
+              <a:t>No implementation experience</a:t>
+            </a:r>
+          </a:p>
+          <a:p>
+            <a:r>
+              <a:rPr lang="en-US" dirty="0"/>
+              <a:t>We would rather move forward with an existing and proven solution now to give users more experience with possible </a:t>
+            </a:r>
+            <a:r>
+              <a:rPr lang="en-US" dirty="0" smtClean="0"/>
+              <a:t>implementations</a:t>
+            </a:r>
+            <a:endParaRPr lang="en-US" dirty="0"/>
+          </a:p>
+        </p:txBody>
+      </p:sp>
+      <p:sp>
+        <p:nvSpPr>
+          <p:cNvPr id="4" name="Date Placeholder 3"/>
+          <p:cNvSpPr>
+            <a:spLocks noGrp="1"/>
+          </p:cNvSpPr>
+          <p:nvPr>
+            <p:ph type="dt" sz="half" idx="10"/>
           </p:nvPr>
         </p:nvSpPr>
         <p:spPr/>
@@ -8075,6 +9352,29 @@
           <a:p>
             <a:r>
               <a:rPr lang="en-US" smtClean="0"/>
+              <a:t>11/7/2016</a:t>
+            </a:r>
+            <a:endParaRPr lang="en-US"/>
+          </a:p>
+        </p:txBody>
+      </p:sp>
+      <p:sp>
+        <p:nvSpPr>
+          <p:cNvPr id="5" name="Footer Placeholder 4"/>
+          <p:cNvSpPr>
+            <a:spLocks noGrp="1"/>
+          </p:cNvSpPr>
+          <p:nvPr>
+            <p:ph type="ftr" sz="quarter" idx="11"/>
+          </p:nvPr>
+        </p:nvSpPr>
+        <p:spPr/>
+        <p:txBody>
+          <a:bodyPr/>
+          <a:lstStyle/>
+          <a:p>
+            <a:r>
+              <a:rPr lang="en-US" smtClean="0"/>
               <a:t>P0361R2: Invoking Algorithms Asynchronously</a:t>
             </a:r>
             <a:endParaRPr lang="en-US"/>
@@ -8083,7 +9383,7 @@
       </p:sp>
       <p:sp>
         <p:nvSpPr>
-          <p:cNvPr id="4" name="Slide Number Placeholder 3"/>
+          <p:cNvPr id="6" name="Slide Number Placeholder 5"/>
           <p:cNvSpPr>
             <a:spLocks noGrp="1"/>
           </p:cNvSpPr>
@@ -8098,7 +9398,7 @@
           </a:bodyPr>
           <a:lstStyle/>
           <a:p>
-            <a:fld id="{65339F38-439B-42BE-A6DB-D203DE66964E}" type="slidenum">
+            <a:fld id="{7848FB04-1C7C-414F-BE18-01CEEBD08DC5}" type="slidenum">
               <a:rPr lang="en-US" smtClean="0"/>
               <a:t>8</a:t>
             </a:fld>
@@ -8109,7 +9409,7 @@
     </p:spTree>
     <p:extLst>
       <p:ext uri="{BB962C8B-B14F-4D97-AF65-F5344CB8AC3E}">
-        <p14:creationId xmlns:p14="http://schemas.microsoft.com/office/powerpoint/2010/main" val="3929842033"/>
+        <p14:creationId xmlns:p14="http://schemas.microsoft.com/office/powerpoint/2010/main" val="2212491759"/>
       </p:ext>
     </p:extLst>
   </p:cSld>
@@ -8123,6 +9423,188 @@
       </p:par>
     </p:tnLst>
   </p:timing>
+</p:sld>
+</file>
+
+<file path=ppt/slides/slide9.xml><?xml version="1.0" encoding="utf-8"?>
+<p:sld xmlns:a="http://schemas.openxmlformats.org/drawingml/2006/main" xmlns:r="http://schemas.openxmlformats.org/officeDocument/2006/relationships" xmlns:p="http://schemas.openxmlformats.org/presentationml/2006/main">
+  <p:cSld>
+    <p:spTree>
+      <p:nvGrpSpPr>
+        <p:cNvPr id="1" name=""/>
+        <p:cNvGrpSpPr/>
+        <p:nvPr/>
+      </p:nvGrpSpPr>
+      <p:grpSpPr>
+        <a:xfrm>
+          <a:off x="0" y="0"/>
+          <a:ext cx="0" cy="0"/>
+          <a:chOff x="0" y="0"/>
+          <a:chExt cx="0" cy="0"/>
+        </a:xfrm>
+      </p:grpSpPr>
+      <p:sp>
+        <p:nvSpPr>
+          <p:cNvPr id="2" name="Title 1"/>
+          <p:cNvSpPr>
+            <a:spLocks noGrp="1"/>
+          </p:cNvSpPr>
+          <p:nvPr>
+            <p:ph type="title"/>
+          </p:nvPr>
+        </p:nvSpPr>
+        <p:spPr/>
+        <p:txBody>
+          <a:bodyPr/>
+          <a:lstStyle/>
+          <a:p>
+            <a:r>
+              <a:rPr lang="en-US" dirty="0" smtClean="0"/>
+              <a:t>Discussion</a:t>
+            </a:r>
+            <a:endParaRPr lang="en-US" dirty="0"/>
+          </a:p>
+        </p:txBody>
+      </p:sp>
+      <p:sp>
+        <p:nvSpPr>
+          <p:cNvPr id="3" name="Content Placeholder 2"/>
+          <p:cNvSpPr>
+            <a:spLocks noGrp="1"/>
+          </p:cNvSpPr>
+          <p:nvPr>
+            <p:ph idx="1"/>
+          </p:nvPr>
+        </p:nvSpPr>
+        <p:spPr/>
+        <p:txBody>
+          <a:bodyPr/>
+          <a:lstStyle/>
+          <a:p>
+            <a:r>
+              <a:rPr lang="en-US" dirty="0" smtClean="0"/>
+              <a:t>Align asynchronous algorithms with networking TS</a:t>
+            </a:r>
+          </a:p>
+          <a:p>
+            <a:pPr lvl="1"/>
+            <a:r>
+              <a:rPr lang="en-US" dirty="0" smtClean="0"/>
+              <a:t>Additional parameter to decide whether to return a future or directly pass a continuation function</a:t>
+            </a:r>
+          </a:p>
+          <a:p>
+            <a:pPr lvl="1"/>
+            <a:endParaRPr lang="en-US" dirty="0"/>
+          </a:p>
+          <a:p>
+            <a:r>
+              <a:rPr lang="en-US" dirty="0" smtClean="0"/>
+              <a:t>Not even sure this is possible </a:t>
+            </a:r>
+          </a:p>
+          <a:p>
+            <a:pPr lvl="1"/>
+            <a:r>
+              <a:rPr lang="en-US" dirty="0" smtClean="0"/>
+              <a:t>Parallel algorithms don’t have an </a:t>
+            </a:r>
+            <a:r>
+              <a:rPr lang="en-US" dirty="0" err="1" smtClean="0"/>
+              <a:t>io_service</a:t>
+            </a:r>
+            <a:endParaRPr lang="en-US" dirty="0" smtClean="0"/>
+          </a:p>
+          <a:p>
+            <a:r>
+              <a:rPr lang="en-US" dirty="0" smtClean="0"/>
+              <a:t>Very limited added functionality with significant implementation overhead </a:t>
+            </a:r>
+            <a:endParaRPr lang="en-US" dirty="0"/>
+          </a:p>
+        </p:txBody>
+      </p:sp>
+      <p:sp>
+        <p:nvSpPr>
+          <p:cNvPr id="4" name="Date Placeholder 3"/>
+          <p:cNvSpPr>
+            <a:spLocks noGrp="1"/>
+          </p:cNvSpPr>
+          <p:nvPr>
+            <p:ph type="dt" sz="half" idx="10"/>
+          </p:nvPr>
+        </p:nvSpPr>
+        <p:spPr/>
+        <p:txBody>
+          <a:bodyPr/>
+          <a:lstStyle/>
+          <a:p>
+            <a:r>
+              <a:rPr lang="en-US" smtClean="0"/>
+              <a:t>11/7/2016</a:t>
+            </a:r>
+            <a:endParaRPr lang="en-US"/>
+          </a:p>
+        </p:txBody>
+      </p:sp>
+      <p:sp>
+        <p:nvSpPr>
+          <p:cNvPr id="5" name="Footer Placeholder 4"/>
+          <p:cNvSpPr>
+            <a:spLocks noGrp="1"/>
+          </p:cNvSpPr>
+          <p:nvPr>
+            <p:ph type="ftr" sz="quarter" idx="11"/>
+          </p:nvPr>
+        </p:nvSpPr>
+        <p:spPr/>
+        <p:txBody>
+          <a:bodyPr/>
+          <a:lstStyle/>
+          <a:p>
+            <a:r>
+              <a:rPr lang="en-US" smtClean="0"/>
+              <a:t>P0361R2: Invoking Algorithms Asynchronously</a:t>
+            </a:r>
+            <a:endParaRPr lang="en-US"/>
+          </a:p>
+        </p:txBody>
+      </p:sp>
+      <p:sp>
+        <p:nvSpPr>
+          <p:cNvPr id="6" name="Slide Number Placeholder 5"/>
+          <p:cNvSpPr>
+            <a:spLocks noGrp="1"/>
+          </p:cNvSpPr>
+          <p:nvPr>
+            <p:ph type="sldNum" sz="quarter" idx="12"/>
+          </p:nvPr>
+        </p:nvSpPr>
+        <p:spPr/>
+        <p:txBody>
+          <a:bodyPr>
+            <a:normAutofit lnSpcReduction="10000"/>
+          </a:bodyPr>
+          <a:lstStyle/>
+          <a:p>
+            <a:fld id="{7848FB04-1C7C-414F-BE18-01CEEBD08DC5}" type="slidenum">
+              <a:rPr lang="en-US" smtClean="0"/>
+              <a:t>9</a:t>
+            </a:fld>
+            <a:endParaRPr lang="en-US"/>
+          </a:p>
+        </p:txBody>
+      </p:sp>
+    </p:spTree>
+    <p:extLst>
+      <p:ext uri="{BB962C8B-B14F-4D97-AF65-F5344CB8AC3E}">
+        <p14:creationId xmlns:p14="http://schemas.microsoft.com/office/powerpoint/2010/main" val="2094580529"/>
+      </p:ext>
+    </p:extLst>
+  </p:cSld>
+  <p:clrMapOvr>
+    <a:masterClrMapping/>
+  </p:clrMapOvr>
 </p:sld>
 </file>
 

</xml_diff>